<commit_message>
vault backup: 2026-02-18 12:36:12
</commit_message>
<xml_diff>
--- a/05_Output/Projects/@Active/NTTDX-Customer-Expansion-Mission/02-materials/FY2026-公共セクター生成AI案件-フェーズ別見通し.pptx
+++ b/05_Output/Projects/@Active/NTTDX-Customer-Expansion-Mission/02-materials/FY2026-公共セクター生成AI案件-フェーズ別見通し.pptx
@@ -11721,7 +11721,7 @@
         <p:spPr>
           <a:xfrm>
             <a:off x="365760" y="4892040"/>
-            <a:ext cx="8229600" cy="182880"/>
+            <a:ext cx="8412480" cy="182880"/>
           </a:xfrm>
           <a:prstGeom prst="rect">
             <a:avLst/>
@@ -11745,7 +11745,7 @@
                 <a:ea typeface="Meiryo UI" pitchFamily="34" charset="-122"/>
                 <a:cs typeface="Meiryo UI" pitchFamily="34" charset="-120"/>
               </a:rPr>
-              <a:t>*FY2025④構築にはNEDO大型R&amp;D案件（149.7億等）を含む。NEDO除外ベース: ~38.9億</a:t>
+              <a:t>*FY2025④構築にはNEDO大型R&amp;D案件（149.7億等）を含む。中央値: ④構築376万 / ⑤運用341万 / ③PoC1,723万（平均は大型案件で大幅上振れ）</a:t>
             </a:r>
             <a:endParaRPr lang="en-US" sz="800" dirty="0"/>
           </a:p>
@@ -15565,7 +15565,7 @@
                 <a:ea typeface="Meiryo UI" pitchFamily="34" charset="-122"/>
                 <a:cs typeface="Meiryo UI" pitchFamily="34" charset="-120"/>
               </a:rPr>
-              <a:t>全公共セクターの構築案件754件の内訳 — 年度推移と平均単価</a:t>
+              <a:t>全公共セクターの構築案件754件の内訳 — 年度推移と単価（中央値/平均）</a:t>
             </a:r>
             <a:endParaRPr lang="en-US" sz="1100" dirty="0"/>
           </a:p>
@@ -15594,13 +15594,14 @@
             <a:tbl>
               <a:tblPr/>
               <a:tblGrid>
-                <a:gridCol w="1645920"/>
+                <a:gridCol w="1554480"/>
+                <a:gridCol w="457200"/>
+                <a:gridCol w="457200"/>
+                <a:gridCol w="457200"/>
                 <a:gridCol w="502920"/>
-                <a:gridCol w="502920"/>
-                <a:gridCol w="502920"/>
-                <a:gridCol w="548640"/>
-                <a:gridCol w="822960"/>
-                <a:gridCol w="4069080"/>
+                <a:gridCol w="777240"/>
+                <a:gridCol w="777240"/>
+                <a:gridCol w="3611880"/>
               </a:tblGrid>
               <a:tr h="274320">
                 <a:tc>
@@ -15960,7 +15961,7 @@
                           <a:ea typeface="Meiryo UI" pitchFamily="34" charset="-122"/>
                           <a:cs typeface="Meiryo UI" pitchFamily="34" charset="-120"/>
                         </a:rPr>
-                        <a:t>平均単価</a:t>
+                        <a:t>中央値</a:t>
                       </a:r>
                       <a:endParaRPr lang="en-US" sz="900" dirty="0">
                         <a:latin typeface="Meiryo UI" charset="0"/>
@@ -16028,7 +16029,7 @@
                           <a:ea typeface="Meiryo UI" pitchFamily="34" charset="-122"/>
                           <a:cs typeface="Meiryo UI" pitchFamily="34" charset="-120"/>
                         </a:rPr>
-                        <a:t>トレンド</a:t>
+                        <a:t>平均</a:t>
                       </a:r>
                       <a:endParaRPr lang="en-US" sz="900" dirty="0">
                         <a:latin typeface="Meiryo UI" charset="0"/>
@@ -16079,6 +16080,74 @@
                     </a:solidFill>
                   </a:tcPr>
                 </a:tc>
+                <a:tc>
+                  <a:txBody>
+                    <a:bodyPr/>
+                    <a:lstStyle/>
+                    <a:p>
+                      <a:pPr algn="ctr" indent="0" marL="0">
+                        <a:buNone/>
+                      </a:pPr>
+                      <a:r>
+                        <a:rPr lang="en-US" sz="900" b="1" dirty="0">
+                          <a:solidFill>
+                            <a:srgbClr val="FFFFFF"/>
+                          </a:solidFill>
+                          <a:latin typeface="Meiryo UI" pitchFamily="34" charset="0"/>
+                          <a:ea typeface="Meiryo UI" pitchFamily="34" charset="-122"/>
+                          <a:cs typeface="Meiryo UI" pitchFamily="34" charset="-120"/>
+                        </a:rPr>
+                        <a:t>トレンド</a:t>
+                      </a:r>
+                      <a:endParaRPr lang="en-US" sz="900" dirty="0">
+                        <a:latin typeface="Meiryo UI" charset="0"/>
+                        <a:ea typeface="Meiryo UI" charset="0"/>
+                        <a:cs typeface="Meiryo UI" charset="0"/>
+                      </a:endParaRPr>
+                    </a:p>
+                  </a:txBody>
+                  <a:tcPr marL="91440" marR="91440" marT="45720" marB="45720" anchor="ctr">
+                    <a:lnL w="6350" cap="flat" cmpd="sng" algn="ctr">
+                      <a:solidFill>
+                        <a:srgbClr val="E0E0E0"/>
+                      </a:solidFill>
+                      <a:prstDash val="solid"/>
+                      <a:round/>
+                      <a:headEnd type="none" w="med" len="med"/>
+                      <a:tailEnd type="none" w="med" len="med"/>
+                    </a:lnL>
+                    <a:lnR w="6350" cap="flat" cmpd="sng" algn="ctr">
+                      <a:solidFill>
+                        <a:srgbClr val="E0E0E0"/>
+                      </a:solidFill>
+                      <a:prstDash val="solid"/>
+                      <a:round/>
+                      <a:headEnd type="none" w="med" len="med"/>
+                      <a:tailEnd type="none" w="med" len="med"/>
+                    </a:lnR>
+                    <a:lnT w="6350" cap="flat" cmpd="sng" algn="ctr">
+                      <a:solidFill>
+                        <a:srgbClr val="E0E0E0"/>
+                      </a:solidFill>
+                      <a:prstDash val="solid"/>
+                      <a:round/>
+                      <a:headEnd type="none" w="med" len="med"/>
+                      <a:tailEnd type="none" w="med" len="med"/>
+                    </a:lnT>
+                    <a:lnB w="6350" cap="flat" cmpd="sng" algn="ctr">
+                      <a:solidFill>
+                        <a:srgbClr val="E0E0E0"/>
+                      </a:solidFill>
+                      <a:prstDash val="solid"/>
+                      <a:round/>
+                      <a:headEnd type="none" w="med" len="med"/>
+                      <a:tailEnd type="none" w="med" len="med"/>
+                    </a:lnB>
+                    <a:solidFill>
+                      <a:srgbClr val="156082"/>
+                    </a:solidFill>
+                  </a:tcPr>
+                </a:tc>
               </a:tr>
               <a:tr h="274320">
                 <a:tc>
@@ -16418,7 +16487,7 @@
                         <a:buNone/>
                       </a:pPr>
                       <a:r>
-                        <a:rPr lang="en-US" sz="1000" b="1" dirty="0">
+                        <a:rPr lang="en-US" sz="1000" dirty="0">
                           <a:solidFill>
                             <a:srgbClr val="333333"/>
                           </a:solidFill>
@@ -16426,7 +16495,7 @@
                           <a:ea typeface="Meiryo UI" pitchFamily="34" charset="-122"/>
                           <a:cs typeface="Meiryo UI" pitchFamily="34" charset="-120"/>
                         </a:rPr>
-                        <a:t>1.6億</a:t>
+                        <a:t>215万</a:t>
                       </a:r>
                       <a:endParaRPr lang="en-US" sz="1000" dirty="0">
                         <a:latin typeface="Meiryo UI" charset="0"/>
@@ -16479,6 +16548,71 @@
                     <a:bodyPr/>
                     <a:lstStyle/>
                     <a:p>
+                      <a:pPr algn="ctr" indent="0" marL="0">
+                        <a:buNone/>
+                      </a:pPr>
+                      <a:r>
+                        <a:rPr lang="en-US" sz="900" dirty="0">
+                          <a:solidFill>
+                            <a:srgbClr val="666666"/>
+                          </a:solidFill>
+                          <a:latin typeface="Meiryo UI" pitchFamily="34" charset="0"/>
+                          <a:ea typeface="Meiryo UI" pitchFamily="34" charset="-122"/>
+                          <a:cs typeface="Meiryo UI" pitchFamily="34" charset="-120"/>
+                        </a:rPr>
+                        <a:t>1,188万</a:t>
+                      </a:r>
+                      <a:endParaRPr lang="en-US" sz="900" dirty="0">
+                        <a:latin typeface="Meiryo UI" charset="0"/>
+                        <a:ea typeface="Meiryo UI" charset="0"/>
+                        <a:cs typeface="Meiryo UI" charset="0"/>
+                      </a:endParaRPr>
+                    </a:p>
+                  </a:txBody>
+                  <a:tcPr marL="91440" marR="91440" marT="45720" marB="45720" anchor="ctr">
+                    <a:lnL w="6350" cap="flat" cmpd="sng" algn="ctr">
+                      <a:solidFill>
+                        <a:srgbClr val="E0E0E0"/>
+                      </a:solidFill>
+                      <a:prstDash val="solid"/>
+                      <a:round/>
+                      <a:headEnd type="none" w="med" len="med"/>
+                      <a:tailEnd type="none" w="med" len="med"/>
+                    </a:lnL>
+                    <a:lnR w="6350" cap="flat" cmpd="sng" algn="ctr">
+                      <a:solidFill>
+                        <a:srgbClr val="E0E0E0"/>
+                      </a:solidFill>
+                      <a:prstDash val="solid"/>
+                      <a:round/>
+                      <a:headEnd type="none" w="med" len="med"/>
+                      <a:tailEnd type="none" w="med" len="med"/>
+                    </a:lnR>
+                    <a:lnT w="6350" cap="flat" cmpd="sng" algn="ctr">
+                      <a:solidFill>
+                        <a:srgbClr val="E0E0E0"/>
+                      </a:solidFill>
+                      <a:prstDash val="solid"/>
+                      <a:round/>
+                      <a:headEnd type="none" w="med" len="med"/>
+                      <a:tailEnd type="none" w="med" len="med"/>
+                    </a:lnT>
+                    <a:lnB w="6350" cap="flat" cmpd="sng" algn="ctr">
+                      <a:solidFill>
+                        <a:srgbClr val="E0E0E0"/>
+                      </a:solidFill>
+                      <a:prstDash val="solid"/>
+                      <a:round/>
+                      <a:headEnd type="none" w="med" len="med"/>
+                      <a:tailEnd type="none" w="med" len="med"/>
+                    </a:lnB>
+                  </a:tcPr>
+                </a:tc>
+                <a:tc>
+                  <a:txBody>
+                    <a:bodyPr/>
+                    <a:lstStyle/>
+                    <a:p>
                       <a:pPr algn="l" indent="0" marL="0">
                         <a:buNone/>
                       </a:pPr>
@@ -16491,7 +16625,7 @@
                           <a:ea typeface="Meiryo UI" pitchFamily="34" charset="-122"/>
                           <a:cs typeface="Meiryo UI" pitchFamily="34" charset="-120"/>
                         </a:rPr>
-                        <a:t>大型案件含む。国R&amp;D多い</a:t>
+                        <a:t>平均は大型R&amp;Dで上振れ</a:t>
                       </a:r>
                       <a:endParaRPr lang="en-US" sz="900" dirty="0">
                         <a:latin typeface="Meiryo UI" charset="0"/>
@@ -16886,9 +17020,74 @@
                           <a:ea typeface="Meiryo UI" pitchFamily="34" charset="-122"/>
                           <a:cs typeface="Meiryo UI" pitchFamily="34" charset="-120"/>
                         </a:rPr>
-                        <a:t>2,148万</a:t>
+                        <a:t>336万</a:t>
                       </a:r>
                       <a:endParaRPr lang="en-US" sz="1000" dirty="0">
+                        <a:latin typeface="Meiryo UI" charset="0"/>
+                        <a:ea typeface="Meiryo UI" charset="0"/>
+                        <a:cs typeface="Meiryo UI" charset="0"/>
+                      </a:endParaRPr>
+                    </a:p>
+                  </a:txBody>
+                  <a:tcPr marL="91440" marR="91440" marT="45720" marB="45720" anchor="ctr">
+                    <a:lnL w="6350" cap="flat" cmpd="sng" algn="ctr">
+                      <a:solidFill>
+                        <a:srgbClr val="E0E0E0"/>
+                      </a:solidFill>
+                      <a:prstDash val="solid"/>
+                      <a:round/>
+                      <a:headEnd type="none" w="med" len="med"/>
+                      <a:tailEnd type="none" w="med" len="med"/>
+                    </a:lnL>
+                    <a:lnR w="6350" cap="flat" cmpd="sng" algn="ctr">
+                      <a:solidFill>
+                        <a:srgbClr val="E0E0E0"/>
+                      </a:solidFill>
+                      <a:prstDash val="solid"/>
+                      <a:round/>
+                      <a:headEnd type="none" w="med" len="med"/>
+                      <a:tailEnd type="none" w="med" len="med"/>
+                    </a:lnR>
+                    <a:lnT w="6350" cap="flat" cmpd="sng" algn="ctr">
+                      <a:solidFill>
+                        <a:srgbClr val="E0E0E0"/>
+                      </a:solidFill>
+                      <a:prstDash val="solid"/>
+                      <a:round/>
+                      <a:headEnd type="none" w="med" len="med"/>
+                      <a:tailEnd type="none" w="med" len="med"/>
+                    </a:lnT>
+                    <a:lnB w="6350" cap="flat" cmpd="sng" algn="ctr">
+                      <a:solidFill>
+                        <a:srgbClr val="E0E0E0"/>
+                      </a:solidFill>
+                      <a:prstDash val="solid"/>
+                      <a:round/>
+                      <a:headEnd type="none" w="med" len="med"/>
+                      <a:tailEnd type="none" w="med" len="med"/>
+                    </a:lnB>
+                  </a:tcPr>
+                </a:tc>
+                <a:tc>
+                  <a:txBody>
+                    <a:bodyPr/>
+                    <a:lstStyle/>
+                    <a:p>
+                      <a:pPr algn="ctr" indent="0" marL="0">
+                        <a:buNone/>
+                      </a:pPr>
+                      <a:r>
+                        <a:rPr lang="en-US" sz="900" dirty="0">
+                          <a:solidFill>
+                            <a:srgbClr val="666666"/>
+                          </a:solidFill>
+                          <a:latin typeface="Meiryo UI" pitchFamily="34" charset="0"/>
+                          <a:ea typeface="Meiryo UI" pitchFamily="34" charset="-122"/>
+                          <a:cs typeface="Meiryo UI" pitchFamily="34" charset="-120"/>
+                        </a:rPr>
+                        <a:t>3,259万</a:t>
+                      </a:r>
+                      <a:endParaRPr lang="en-US" sz="900" dirty="0">
                         <a:latin typeface="Meiryo UI" charset="0"/>
                         <a:ea typeface="Meiryo UI" charset="0"/>
                         <a:cs typeface="Meiryo UI" charset="0"/>
@@ -17338,7 +17537,137 @@
                         <a:buNone/>
                       </a:pPr>
                       <a:r>
-                        <a:rPr lang="en-US" sz="1000" dirty="0">
+                        <a:rPr lang="en-US" sz="1000" b="1" dirty="0">
+                          <a:solidFill>
+                            <a:srgbClr val="156082"/>
+                          </a:solidFill>
+                          <a:latin typeface="Meiryo UI" pitchFamily="34" charset="0"/>
+                          <a:ea typeface="Meiryo UI" pitchFamily="34" charset="-122"/>
+                          <a:cs typeface="Meiryo UI" pitchFamily="34" charset="-120"/>
+                        </a:rPr>
+                        <a:t>772万</a:t>
+                      </a:r>
+                      <a:endParaRPr lang="en-US" sz="1000" dirty="0">
+                        <a:latin typeface="Meiryo UI" charset="0"/>
+                        <a:ea typeface="Meiryo UI" charset="0"/>
+                        <a:cs typeface="Meiryo UI" charset="0"/>
+                      </a:endParaRPr>
+                    </a:p>
+                  </a:txBody>
+                  <a:tcPr marL="91440" marR="91440" marT="45720" marB="45720" anchor="ctr">
+                    <a:lnL w="6350" cap="flat" cmpd="sng" algn="ctr">
+                      <a:solidFill>
+                        <a:srgbClr val="E0E0E0"/>
+                      </a:solidFill>
+                      <a:prstDash val="solid"/>
+                      <a:round/>
+                      <a:headEnd type="none" w="med" len="med"/>
+                      <a:tailEnd type="none" w="med" len="med"/>
+                    </a:lnL>
+                    <a:lnR w="6350" cap="flat" cmpd="sng" algn="ctr">
+                      <a:solidFill>
+                        <a:srgbClr val="E0E0E0"/>
+                      </a:solidFill>
+                      <a:prstDash val="solid"/>
+                      <a:round/>
+                      <a:headEnd type="none" w="med" len="med"/>
+                      <a:tailEnd type="none" w="med" len="med"/>
+                    </a:lnR>
+                    <a:lnT w="6350" cap="flat" cmpd="sng" algn="ctr">
+                      <a:solidFill>
+                        <a:srgbClr val="E0E0E0"/>
+                      </a:solidFill>
+                      <a:prstDash val="solid"/>
+                      <a:round/>
+                      <a:headEnd type="none" w="med" len="med"/>
+                      <a:tailEnd type="none" w="med" len="med"/>
+                    </a:lnT>
+                    <a:lnB w="6350" cap="flat" cmpd="sng" algn="ctr">
+                      <a:solidFill>
+                        <a:srgbClr val="E0E0E0"/>
+                      </a:solidFill>
+                      <a:prstDash val="solid"/>
+                      <a:round/>
+                      <a:headEnd type="none" w="med" len="med"/>
+                      <a:tailEnd type="none" w="med" len="med"/>
+                    </a:lnB>
+                  </a:tcPr>
+                </a:tc>
+                <a:tc>
+                  <a:txBody>
+                    <a:bodyPr/>
+                    <a:lstStyle/>
+                    <a:p>
+                      <a:pPr algn="ctr" indent="0" marL="0">
+                        <a:buNone/>
+                      </a:pPr>
+                      <a:r>
+                        <a:rPr lang="en-US" sz="900" dirty="0">
+                          <a:solidFill>
+                            <a:srgbClr val="666666"/>
+                          </a:solidFill>
+                          <a:latin typeface="Meiryo UI" pitchFamily="34" charset="0"/>
+                          <a:ea typeface="Meiryo UI" pitchFamily="34" charset="-122"/>
+                          <a:cs typeface="Meiryo UI" pitchFamily="34" charset="-120"/>
+                        </a:rPr>
+                        <a:t>1.4億</a:t>
+                      </a:r>
+                      <a:endParaRPr lang="en-US" sz="900" dirty="0">
+                        <a:latin typeface="Meiryo UI" charset="0"/>
+                        <a:ea typeface="Meiryo UI" charset="0"/>
+                        <a:cs typeface="Meiryo UI" charset="0"/>
+                      </a:endParaRPr>
+                    </a:p>
+                  </a:txBody>
+                  <a:tcPr marL="91440" marR="91440" marT="45720" marB="45720" anchor="ctr">
+                    <a:lnL w="6350" cap="flat" cmpd="sng" algn="ctr">
+                      <a:solidFill>
+                        <a:srgbClr val="E0E0E0"/>
+                      </a:solidFill>
+                      <a:prstDash val="solid"/>
+                      <a:round/>
+                      <a:headEnd type="none" w="med" len="med"/>
+                      <a:tailEnd type="none" w="med" len="med"/>
+                    </a:lnL>
+                    <a:lnR w="6350" cap="flat" cmpd="sng" algn="ctr">
+                      <a:solidFill>
+                        <a:srgbClr val="E0E0E0"/>
+                      </a:solidFill>
+                      <a:prstDash val="solid"/>
+                      <a:round/>
+                      <a:headEnd type="none" w="med" len="med"/>
+                      <a:tailEnd type="none" w="med" len="med"/>
+                    </a:lnR>
+                    <a:lnT w="6350" cap="flat" cmpd="sng" algn="ctr">
+                      <a:solidFill>
+                        <a:srgbClr val="E0E0E0"/>
+                      </a:solidFill>
+                      <a:prstDash val="solid"/>
+                      <a:round/>
+                      <a:headEnd type="none" w="med" len="med"/>
+                      <a:tailEnd type="none" w="med" len="med"/>
+                    </a:lnT>
+                    <a:lnB w="6350" cap="flat" cmpd="sng" algn="ctr">
+                      <a:solidFill>
+                        <a:srgbClr val="E0E0E0"/>
+                      </a:solidFill>
+                      <a:prstDash val="solid"/>
+                      <a:round/>
+                      <a:headEnd type="none" w="med" len="med"/>
+                      <a:tailEnd type="none" w="med" len="med"/>
+                    </a:lnB>
+                  </a:tcPr>
+                </a:tc>
+                <a:tc>
+                  <a:txBody>
+                    <a:bodyPr/>
+                    <a:lstStyle/>
+                    <a:p>
+                      <a:pPr algn="l" indent="0" marL="0">
+                        <a:buNone/>
+                      </a:pPr>
+                      <a:r>
+                        <a:rPr lang="en-US" sz="900" dirty="0">
                           <a:solidFill>
                             <a:srgbClr val="333333"/>
                           </a:solidFill>
@@ -17346,72 +17675,7 @@
                           <a:ea typeface="Meiryo UI" pitchFamily="34" charset="-122"/>
                           <a:cs typeface="Meiryo UI" pitchFamily="34" charset="-120"/>
                         </a:rPr>
-                        <a:t>3,321万</a:t>
-                      </a:r>
-                      <a:endParaRPr lang="en-US" sz="1000" dirty="0">
-                        <a:latin typeface="Meiryo UI" charset="0"/>
-                        <a:ea typeface="Meiryo UI" charset="0"/>
-                        <a:cs typeface="Meiryo UI" charset="0"/>
-                      </a:endParaRPr>
-                    </a:p>
-                  </a:txBody>
-                  <a:tcPr marL="91440" marR="91440" marT="45720" marB="45720" anchor="ctr">
-                    <a:lnL w="6350" cap="flat" cmpd="sng" algn="ctr">
-                      <a:solidFill>
-                        <a:srgbClr val="E0E0E0"/>
-                      </a:solidFill>
-                      <a:prstDash val="solid"/>
-                      <a:round/>
-                      <a:headEnd type="none" w="med" len="med"/>
-                      <a:tailEnd type="none" w="med" len="med"/>
-                    </a:lnL>
-                    <a:lnR w="6350" cap="flat" cmpd="sng" algn="ctr">
-                      <a:solidFill>
-                        <a:srgbClr val="E0E0E0"/>
-                      </a:solidFill>
-                      <a:prstDash val="solid"/>
-                      <a:round/>
-                      <a:headEnd type="none" w="med" len="med"/>
-                      <a:tailEnd type="none" w="med" len="med"/>
-                    </a:lnR>
-                    <a:lnT w="6350" cap="flat" cmpd="sng" algn="ctr">
-                      <a:solidFill>
-                        <a:srgbClr val="E0E0E0"/>
-                      </a:solidFill>
-                      <a:prstDash val="solid"/>
-                      <a:round/>
-                      <a:headEnd type="none" w="med" len="med"/>
-                      <a:tailEnd type="none" w="med" len="med"/>
-                    </a:lnT>
-                    <a:lnB w="6350" cap="flat" cmpd="sng" algn="ctr">
-                      <a:solidFill>
-                        <a:srgbClr val="E0E0E0"/>
-                      </a:solidFill>
-                      <a:prstDash val="solid"/>
-                      <a:round/>
-                      <a:headEnd type="none" w="med" len="med"/>
-                      <a:tailEnd type="none" w="med" len="med"/>
-                    </a:lnB>
-                  </a:tcPr>
-                </a:tc>
-                <a:tc>
-                  <a:txBody>
-                    <a:bodyPr/>
-                    <a:lstStyle/>
-                    <a:p>
-                      <a:pPr algn="l" indent="0" marL="0">
-                        <a:buNone/>
-                      </a:pPr>
-                      <a:r>
-                        <a:rPr lang="en-US" sz="900" dirty="0">
-                          <a:solidFill>
-                            <a:srgbClr val="333333"/>
-                          </a:solidFill>
-                          <a:latin typeface="Meiryo UI" pitchFamily="34" charset="0"/>
-                          <a:ea typeface="Meiryo UI" pitchFamily="34" charset="-122"/>
-                          <a:cs typeface="Meiryo UI" pitchFamily="34" charset="-120"/>
-                        </a:rPr>
-                        <a:t>堅調推移</a:t>
+                        <a:t>NEDO等で平均大幅上振れ</a:t>
                       </a:r>
                       <a:endParaRPr lang="en-US" sz="900" dirty="0">
                         <a:latin typeface="Meiryo UI" charset="0"/>
@@ -17806,7 +18070,7 @@
                           <a:ea typeface="Meiryo UI" pitchFamily="34" charset="-122"/>
                           <a:cs typeface="Meiryo UI" pitchFamily="34" charset="-120"/>
                         </a:rPr>
-                        <a:t>3,685万</a:t>
+                        <a:t>428万</a:t>
                       </a:r>
                       <a:endParaRPr lang="en-US" sz="1000" dirty="0">
                         <a:latin typeface="Meiryo UI" charset="0"/>
@@ -17859,6 +18123,71 @@
                     <a:bodyPr/>
                     <a:lstStyle/>
                     <a:p>
+                      <a:pPr algn="ctr" indent="0" marL="0">
+                        <a:buNone/>
+                      </a:pPr>
+                      <a:r>
+                        <a:rPr lang="en-US" sz="900" dirty="0">
+                          <a:solidFill>
+                            <a:srgbClr val="666666"/>
+                          </a:solidFill>
+                          <a:latin typeface="Meiryo UI" pitchFamily="34" charset="0"/>
+                          <a:ea typeface="Meiryo UI" pitchFamily="34" charset="-122"/>
+                          <a:cs typeface="Meiryo UI" pitchFamily="34" charset="-120"/>
+                        </a:rPr>
+                        <a:t>4,905万</a:t>
+                      </a:r>
+                      <a:endParaRPr lang="en-US" sz="900" dirty="0">
+                        <a:latin typeface="Meiryo UI" charset="0"/>
+                        <a:ea typeface="Meiryo UI" charset="0"/>
+                        <a:cs typeface="Meiryo UI" charset="0"/>
+                      </a:endParaRPr>
+                    </a:p>
+                  </a:txBody>
+                  <a:tcPr marL="91440" marR="91440" marT="45720" marB="45720" anchor="ctr">
+                    <a:lnL w="6350" cap="flat" cmpd="sng" algn="ctr">
+                      <a:solidFill>
+                        <a:srgbClr val="E0E0E0"/>
+                      </a:solidFill>
+                      <a:prstDash val="solid"/>
+                      <a:round/>
+                      <a:headEnd type="none" w="med" len="med"/>
+                      <a:tailEnd type="none" w="med" len="med"/>
+                    </a:lnL>
+                    <a:lnR w="6350" cap="flat" cmpd="sng" algn="ctr">
+                      <a:solidFill>
+                        <a:srgbClr val="E0E0E0"/>
+                      </a:solidFill>
+                      <a:prstDash val="solid"/>
+                      <a:round/>
+                      <a:headEnd type="none" w="med" len="med"/>
+                      <a:tailEnd type="none" w="med" len="med"/>
+                    </a:lnR>
+                    <a:lnT w="6350" cap="flat" cmpd="sng" algn="ctr">
+                      <a:solidFill>
+                        <a:srgbClr val="E0E0E0"/>
+                      </a:solidFill>
+                      <a:prstDash val="solid"/>
+                      <a:round/>
+                      <a:headEnd type="none" w="med" len="med"/>
+                      <a:tailEnd type="none" w="med" len="med"/>
+                    </a:lnT>
+                    <a:lnB w="6350" cap="flat" cmpd="sng" algn="ctr">
+                      <a:solidFill>
+                        <a:srgbClr val="E0E0E0"/>
+                      </a:solidFill>
+                      <a:prstDash val="solid"/>
+                      <a:round/>
+                      <a:headEnd type="none" w="med" len="med"/>
+                      <a:tailEnd type="none" w="med" len="med"/>
+                    </a:lnB>
+                  </a:tcPr>
+                </a:tc>
+                <a:tc>
+                  <a:txBody>
+                    <a:bodyPr/>
+                    <a:lstStyle/>
+                    <a:p>
                       <a:pPr algn="l" indent="0" marL="0">
                         <a:buNone/>
                       </a:pPr>
@@ -17871,7 +18200,7 @@
                           <a:ea typeface="Meiryo UI" pitchFamily="34" charset="-122"/>
                           <a:cs typeface="Meiryo UI" pitchFamily="34" charset="-120"/>
                         </a:rPr>
-                        <a:t>急成長。SaaS型が主流化</a:t>
+                        <a:t>急成長。SaaS型主流化</a:t>
                       </a:r>
                       <a:endParaRPr lang="en-US" sz="900" dirty="0">
                         <a:latin typeface="Meiryo UI" charset="0"/>
@@ -18266,7 +18595,7 @@
                           <a:ea typeface="Meiryo UI" pitchFamily="34" charset="-122"/>
                           <a:cs typeface="Meiryo UI" pitchFamily="34" charset="-120"/>
                         </a:rPr>
-                        <a:t>1,012万</a:t>
+                        <a:t>182万</a:t>
                       </a:r>
                       <a:endParaRPr lang="en-US" sz="1000" dirty="0">
                         <a:latin typeface="Meiryo UI" charset="0"/>
@@ -18319,6 +18648,71 @@
                     <a:bodyPr/>
                     <a:lstStyle/>
                     <a:p>
+                      <a:pPr algn="ctr" indent="0" marL="0">
+                        <a:buNone/>
+                      </a:pPr>
+                      <a:r>
+                        <a:rPr lang="en-US" sz="900" dirty="0">
+                          <a:solidFill>
+                            <a:srgbClr val="666666"/>
+                          </a:solidFill>
+                          <a:latin typeface="Meiryo UI" pitchFamily="34" charset="0"/>
+                          <a:ea typeface="Meiryo UI" pitchFamily="34" charset="-122"/>
+                          <a:cs typeface="Meiryo UI" pitchFamily="34" charset="-120"/>
+                        </a:rPr>
+                        <a:t>427万</a:t>
+                      </a:r>
+                      <a:endParaRPr lang="en-US" sz="900" dirty="0">
+                        <a:latin typeface="Meiryo UI" charset="0"/>
+                        <a:ea typeface="Meiryo UI" charset="0"/>
+                        <a:cs typeface="Meiryo UI" charset="0"/>
+                      </a:endParaRPr>
+                    </a:p>
+                  </a:txBody>
+                  <a:tcPr marL="91440" marR="91440" marT="45720" marB="45720" anchor="ctr">
+                    <a:lnL w="6350" cap="flat" cmpd="sng" algn="ctr">
+                      <a:solidFill>
+                        <a:srgbClr val="E0E0E0"/>
+                      </a:solidFill>
+                      <a:prstDash val="solid"/>
+                      <a:round/>
+                      <a:headEnd type="none" w="med" len="med"/>
+                      <a:tailEnd type="none" w="med" len="med"/>
+                    </a:lnL>
+                    <a:lnR w="6350" cap="flat" cmpd="sng" algn="ctr">
+                      <a:solidFill>
+                        <a:srgbClr val="E0E0E0"/>
+                      </a:solidFill>
+                      <a:prstDash val="solid"/>
+                      <a:round/>
+                      <a:headEnd type="none" w="med" len="med"/>
+                      <a:tailEnd type="none" w="med" len="med"/>
+                    </a:lnR>
+                    <a:lnT w="6350" cap="flat" cmpd="sng" algn="ctr">
+                      <a:solidFill>
+                        <a:srgbClr val="E0E0E0"/>
+                      </a:solidFill>
+                      <a:prstDash val="solid"/>
+                      <a:round/>
+                      <a:headEnd type="none" w="med" len="med"/>
+                      <a:tailEnd type="none" w="med" len="med"/>
+                    </a:lnT>
+                    <a:lnB w="6350" cap="flat" cmpd="sng" algn="ctr">
+                      <a:solidFill>
+                        <a:srgbClr val="E0E0E0"/>
+                      </a:solidFill>
+                      <a:prstDash val="solid"/>
+                      <a:round/>
+                      <a:headEnd type="none" w="med" len="med"/>
+                      <a:tailEnd type="none" w="med" len="med"/>
+                    </a:lnB>
+                  </a:tcPr>
+                </a:tc>
+                <a:tc>
+                  <a:txBody>
+                    <a:bodyPr/>
+                    <a:lstStyle/>
+                    <a:p>
                       <a:pPr algn="l" indent="0" marL="0">
                         <a:buNone/>
                       </a:pPr>
@@ -18331,7 +18725,7 @@
                           <a:ea typeface="Meiryo UI" pitchFamily="34" charset="-122"/>
                           <a:cs typeface="Meiryo UI" pitchFamily="34" charset="-120"/>
                         </a:rPr>
-                        <a:t>着実増加。技術差別化ポイント</a:t>
+                        <a:t>着実増加。技術差別化</a:t>
                       </a:r>
                       <a:endParaRPr lang="en-US" sz="900" dirty="0">
                         <a:latin typeface="Meiryo UI" charset="0"/>
@@ -18726,9 +19120,74 @@
                           <a:ea typeface="Meiryo UI" pitchFamily="34" charset="-122"/>
                           <a:cs typeface="Meiryo UI" pitchFamily="34" charset="-120"/>
                         </a:rPr>
-                        <a:t>1,462万</a:t>
+                        <a:t>-</a:t>
                       </a:r>
                       <a:endParaRPr lang="en-US" sz="1000" dirty="0">
+                        <a:latin typeface="Meiryo UI" charset="0"/>
+                        <a:ea typeface="Meiryo UI" charset="0"/>
+                        <a:cs typeface="Meiryo UI" charset="0"/>
+                      </a:endParaRPr>
+                    </a:p>
+                  </a:txBody>
+                  <a:tcPr marL="91440" marR="91440" marT="45720" marB="45720" anchor="ctr">
+                    <a:lnL w="6350" cap="flat" cmpd="sng" algn="ctr">
+                      <a:solidFill>
+                        <a:srgbClr val="E0E0E0"/>
+                      </a:solidFill>
+                      <a:prstDash val="solid"/>
+                      <a:round/>
+                      <a:headEnd type="none" w="med" len="med"/>
+                      <a:tailEnd type="none" w="med" len="med"/>
+                    </a:lnL>
+                    <a:lnR w="6350" cap="flat" cmpd="sng" algn="ctr">
+                      <a:solidFill>
+                        <a:srgbClr val="E0E0E0"/>
+                      </a:solidFill>
+                      <a:prstDash val="solid"/>
+                      <a:round/>
+                      <a:headEnd type="none" w="med" len="med"/>
+                      <a:tailEnd type="none" w="med" len="med"/>
+                    </a:lnR>
+                    <a:lnT w="6350" cap="flat" cmpd="sng" algn="ctr">
+                      <a:solidFill>
+                        <a:srgbClr val="E0E0E0"/>
+                      </a:solidFill>
+                      <a:prstDash val="solid"/>
+                      <a:round/>
+                      <a:headEnd type="none" w="med" len="med"/>
+                      <a:tailEnd type="none" w="med" len="med"/>
+                    </a:lnT>
+                    <a:lnB w="6350" cap="flat" cmpd="sng" algn="ctr">
+                      <a:solidFill>
+                        <a:srgbClr val="E0E0E0"/>
+                      </a:solidFill>
+                      <a:prstDash val="solid"/>
+                      <a:round/>
+                      <a:headEnd type="none" w="med" len="med"/>
+                      <a:tailEnd type="none" w="med" len="med"/>
+                    </a:lnB>
+                  </a:tcPr>
+                </a:tc>
+                <a:tc>
+                  <a:txBody>
+                    <a:bodyPr/>
+                    <a:lstStyle/>
+                    <a:p>
+                      <a:pPr algn="ctr" indent="0" marL="0">
+                        <a:buNone/>
+                      </a:pPr>
+                      <a:r>
+                        <a:rPr lang="en-US" sz="900" dirty="0">
+                          <a:solidFill>
+                            <a:srgbClr val="333333"/>
+                          </a:solidFill>
+                          <a:latin typeface="Meiryo UI" pitchFamily="34" charset="0"/>
+                          <a:ea typeface="Meiryo UI" pitchFamily="34" charset="-122"/>
+                          <a:cs typeface="Meiryo UI" pitchFamily="34" charset="-120"/>
+                        </a:rPr>
+                        <a:t>-</a:t>
+                      </a:r>
+                      <a:endParaRPr lang="en-US" sz="900" dirty="0">
                         <a:latin typeface="Meiryo UI" charset="0"/>
                         <a:ea typeface="Meiryo UI" charset="0"/>
                         <a:cs typeface="Meiryo UI" charset="0"/>
@@ -19186,7 +19645,7 @@
                           <a:ea typeface="Meiryo UI" pitchFamily="34" charset="-122"/>
                           <a:cs typeface="Meiryo UI" pitchFamily="34" charset="-120"/>
                         </a:rPr>
-                        <a:t>2,425万</a:t>
+                        <a:t>3,960万</a:t>
                       </a:r>
                       <a:endParaRPr lang="en-US" sz="1000" dirty="0">
                         <a:latin typeface="Meiryo UI" charset="0"/>
@@ -19239,6 +19698,71 @@
                     <a:bodyPr/>
                     <a:lstStyle/>
                     <a:p>
+                      <a:pPr algn="ctr" indent="0" marL="0">
+                        <a:buNone/>
+                      </a:pPr>
+                      <a:r>
+                        <a:rPr lang="en-US" sz="900" dirty="0">
+                          <a:solidFill>
+                            <a:srgbClr val="666666"/>
+                          </a:solidFill>
+                          <a:latin typeface="Meiryo UI" pitchFamily="34" charset="0"/>
+                          <a:ea typeface="Meiryo UI" pitchFamily="34" charset="-122"/>
+                          <a:cs typeface="Meiryo UI" pitchFamily="34" charset="-120"/>
+                        </a:rPr>
+                        <a:t>3,758万</a:t>
+                      </a:r>
+                      <a:endParaRPr lang="en-US" sz="900" dirty="0">
+                        <a:latin typeface="Meiryo UI" charset="0"/>
+                        <a:ea typeface="Meiryo UI" charset="0"/>
+                        <a:cs typeface="Meiryo UI" charset="0"/>
+                      </a:endParaRPr>
+                    </a:p>
+                  </a:txBody>
+                  <a:tcPr marL="91440" marR="91440" marT="45720" marB="45720" anchor="ctr">
+                    <a:lnL w="6350" cap="flat" cmpd="sng" algn="ctr">
+                      <a:solidFill>
+                        <a:srgbClr val="E0E0E0"/>
+                      </a:solidFill>
+                      <a:prstDash val="solid"/>
+                      <a:round/>
+                      <a:headEnd type="none" w="med" len="med"/>
+                      <a:tailEnd type="none" w="med" len="med"/>
+                    </a:lnL>
+                    <a:lnR w="6350" cap="flat" cmpd="sng" algn="ctr">
+                      <a:solidFill>
+                        <a:srgbClr val="E0E0E0"/>
+                      </a:solidFill>
+                      <a:prstDash val="solid"/>
+                      <a:round/>
+                      <a:headEnd type="none" w="med" len="med"/>
+                      <a:tailEnd type="none" w="med" len="med"/>
+                    </a:lnR>
+                    <a:lnT w="6350" cap="flat" cmpd="sng" algn="ctr">
+                      <a:solidFill>
+                        <a:srgbClr val="E0E0E0"/>
+                      </a:solidFill>
+                      <a:prstDash val="solid"/>
+                      <a:round/>
+                      <a:headEnd type="none" w="med" len="med"/>
+                      <a:tailEnd type="none" w="med" len="med"/>
+                    </a:lnT>
+                    <a:lnB w="6350" cap="flat" cmpd="sng" algn="ctr">
+                      <a:solidFill>
+                        <a:srgbClr val="E0E0E0"/>
+                      </a:solidFill>
+                      <a:prstDash val="solid"/>
+                      <a:round/>
+                      <a:headEnd type="none" w="med" len="med"/>
+                      <a:tailEnd type="none" w="med" len="med"/>
+                    </a:lnB>
+                  </a:tcPr>
+                </a:tc>
+                <a:tc>
+                  <a:txBody>
+                    <a:bodyPr/>
+                    <a:lstStyle/>
+                    <a:p>
                       <a:pPr algn="l" indent="0" marL="0">
                         <a:buNone/>
                       </a:pPr>
@@ -19251,7 +19775,7 @@
                           <a:ea typeface="Meiryo UI" pitchFamily="34" charset="-122"/>
                           <a:cs typeface="Meiryo UI" pitchFamily="34" charset="-120"/>
                         </a:rPr>
-                        <a:t>高単価。英語AI等</a:t>
+                        <a:t>高単価。N=3</a:t>
                       </a:r>
                       <a:endParaRPr lang="en-US" sz="900" dirty="0">
                         <a:latin typeface="Meiryo UI" charset="0"/>
@@ -19638,15 +20162,15 @@
                         <a:buNone/>
                       </a:pPr>
                       <a:r>
-                        <a:rPr lang="en-US" sz="1000" b="1" dirty="0">
-                          <a:solidFill>
-                            <a:srgbClr val="156082"/>
-                          </a:solidFill>
-                          <a:latin typeface="Meiryo UI" pitchFamily="34" charset="0"/>
-                          <a:ea typeface="Meiryo UI" pitchFamily="34" charset="-122"/>
-                          <a:cs typeface="Meiryo UI" pitchFamily="34" charset="-120"/>
-                        </a:rPr>
-                        <a:t>2,373万</a:t>
+                        <a:rPr lang="en-US" sz="1000" dirty="0">
+                          <a:solidFill>
+                            <a:srgbClr val="333333"/>
+                          </a:solidFill>
+                          <a:latin typeface="Meiryo UI" pitchFamily="34" charset="0"/>
+                          <a:ea typeface="Meiryo UI" pitchFamily="34" charset="-122"/>
+                          <a:cs typeface="Meiryo UI" pitchFamily="34" charset="-120"/>
+                        </a:rPr>
+                        <a:t>254万</a:t>
                       </a:r>
                       <a:endParaRPr lang="en-US" sz="1000" dirty="0">
                         <a:latin typeface="Meiryo UI" charset="0"/>
@@ -19699,6 +20223,71 @@
                     <a:bodyPr/>
                     <a:lstStyle/>
                     <a:p>
+                      <a:pPr algn="ctr" indent="0" marL="0">
+                        <a:buNone/>
+                      </a:pPr>
+                      <a:r>
+                        <a:rPr lang="en-US" sz="900" dirty="0">
+                          <a:solidFill>
+                            <a:srgbClr val="666666"/>
+                          </a:solidFill>
+                          <a:latin typeface="Meiryo UI" pitchFamily="34" charset="0"/>
+                          <a:ea typeface="Meiryo UI" pitchFamily="34" charset="-122"/>
+                          <a:cs typeface="Meiryo UI" pitchFamily="34" charset="-120"/>
+                        </a:rPr>
+                        <a:t>527万</a:t>
+                      </a:r>
+                      <a:endParaRPr lang="en-US" sz="900" dirty="0">
+                        <a:latin typeface="Meiryo UI" charset="0"/>
+                        <a:ea typeface="Meiryo UI" charset="0"/>
+                        <a:cs typeface="Meiryo UI" charset="0"/>
+                      </a:endParaRPr>
+                    </a:p>
+                  </a:txBody>
+                  <a:tcPr marL="91440" marR="91440" marT="45720" marB="45720" anchor="ctr">
+                    <a:lnL w="6350" cap="flat" cmpd="sng" algn="ctr">
+                      <a:solidFill>
+                        <a:srgbClr val="E0E0E0"/>
+                      </a:solidFill>
+                      <a:prstDash val="solid"/>
+                      <a:round/>
+                      <a:headEnd type="none" w="med" len="med"/>
+                      <a:tailEnd type="none" w="med" len="med"/>
+                    </a:lnL>
+                    <a:lnR w="6350" cap="flat" cmpd="sng" algn="ctr">
+                      <a:solidFill>
+                        <a:srgbClr val="E0E0E0"/>
+                      </a:solidFill>
+                      <a:prstDash val="solid"/>
+                      <a:round/>
+                      <a:headEnd type="none" w="med" len="med"/>
+                      <a:tailEnd type="none" w="med" len="med"/>
+                    </a:lnR>
+                    <a:lnT w="6350" cap="flat" cmpd="sng" algn="ctr">
+                      <a:solidFill>
+                        <a:srgbClr val="E0E0E0"/>
+                      </a:solidFill>
+                      <a:prstDash val="solid"/>
+                      <a:round/>
+                      <a:headEnd type="none" w="med" len="med"/>
+                      <a:tailEnd type="none" w="med" len="med"/>
+                    </a:lnT>
+                    <a:lnB w="6350" cap="flat" cmpd="sng" algn="ctr">
+                      <a:solidFill>
+                        <a:srgbClr val="E0E0E0"/>
+                      </a:solidFill>
+                      <a:prstDash val="solid"/>
+                      <a:round/>
+                      <a:headEnd type="none" w="med" len="med"/>
+                      <a:tailEnd type="none" w="med" len="med"/>
+                    </a:lnB>
+                  </a:tcPr>
+                </a:tc>
+                <a:tc>
+                  <a:txBody>
+                    <a:bodyPr/>
+                    <a:lstStyle/>
+                    <a:p>
                       <a:pPr algn="l" indent="0" marL="0">
                         <a:buNone/>
                       </a:pPr>
@@ -19711,7 +20300,7 @@
                           <a:ea typeface="Meiryo UI" pitchFamily="34" charset="-122"/>
                           <a:cs typeface="Meiryo UI" pitchFamily="34" charset="-120"/>
                         </a:rPr>
-                        <a:t>高単価で急拡大</a:t>
+                        <a:t>急拡大中</a:t>
                       </a:r>
                       <a:endParaRPr lang="en-US" sz="900" dirty="0">
                         <a:latin typeface="Meiryo UI" charset="0"/>
@@ -20109,6 +20698,85 @@
                       <a:pPr algn="ctr" indent="0" marL="0">
                         <a:buNone/>
                       </a:pPr>
+                      <a:r>
+                        <a:rPr lang="en-US" sz="1000" b="1" dirty="0">
+                          <a:solidFill>
+                            <a:srgbClr val="156082"/>
+                          </a:solidFill>
+                          <a:latin typeface="Meiryo UI" pitchFamily="34" charset="0"/>
+                          <a:ea typeface="Meiryo UI" pitchFamily="34" charset="-122"/>
+                          <a:cs typeface="Meiryo UI" pitchFamily="34" charset="-120"/>
+                        </a:rPr>
+                        <a:t>376万</a:t>
+                      </a:r>
+                      <a:endParaRPr lang="en-US" sz="1000" dirty="0">
+                        <a:latin typeface="Meiryo UI" charset="0"/>
+                        <a:ea typeface="Meiryo UI" charset="0"/>
+                        <a:cs typeface="Meiryo UI" charset="0"/>
+                      </a:endParaRPr>
+                    </a:p>
+                  </a:txBody>
+                  <a:tcPr marL="91440" marR="91440" marT="45720" marB="45720" anchor="ctr">
+                    <a:lnL w="6350" cap="flat" cmpd="sng" algn="ctr">
+                      <a:solidFill>
+                        <a:srgbClr val="E0E0E0"/>
+                      </a:solidFill>
+                      <a:prstDash val="solid"/>
+                      <a:round/>
+                      <a:headEnd type="none" w="med" len="med"/>
+                      <a:tailEnd type="none" w="med" len="med"/>
+                    </a:lnL>
+                    <a:lnR w="6350" cap="flat" cmpd="sng" algn="ctr">
+                      <a:solidFill>
+                        <a:srgbClr val="E0E0E0"/>
+                      </a:solidFill>
+                      <a:prstDash val="solid"/>
+                      <a:round/>
+                      <a:headEnd type="none" w="med" len="med"/>
+                      <a:tailEnd type="none" w="med" len="med"/>
+                    </a:lnR>
+                    <a:lnT w="6350" cap="flat" cmpd="sng" algn="ctr">
+                      <a:solidFill>
+                        <a:srgbClr val="E0E0E0"/>
+                      </a:solidFill>
+                      <a:prstDash val="solid"/>
+                      <a:round/>
+                      <a:headEnd type="none" w="med" len="med"/>
+                      <a:tailEnd type="none" w="med" len="med"/>
+                    </a:lnT>
+                    <a:lnB w="6350" cap="flat" cmpd="sng" algn="ctr">
+                      <a:solidFill>
+                        <a:srgbClr val="E0E0E0"/>
+                      </a:solidFill>
+                      <a:prstDash val="solid"/>
+                      <a:round/>
+                      <a:headEnd type="none" w="med" len="med"/>
+                      <a:tailEnd type="none" w="med" len="med"/>
+                    </a:lnB>
+                    <a:solidFill>
+                      <a:srgbClr val="EDF7FA"/>
+                    </a:solidFill>
+                  </a:tcPr>
+                </a:tc>
+                <a:tc>
+                  <a:txBody>
+                    <a:bodyPr/>
+                    <a:lstStyle/>
+                    <a:p>
+                      <a:pPr algn="ctr" indent="0" marL="0">
+                        <a:buNone/>
+                      </a:pPr>
+                      <a:r>
+                        <a:rPr lang="en-US" sz="1000" b="1" dirty="0">
+                          <a:solidFill>
+                            <a:srgbClr val="156082"/>
+                          </a:solidFill>
+                          <a:latin typeface="Meiryo UI" pitchFamily="34" charset="0"/>
+                          <a:ea typeface="Meiryo UI" pitchFamily="34" charset="-122"/>
+                          <a:cs typeface="Meiryo UI" pitchFamily="34" charset="-120"/>
+                        </a:rPr>
+                        <a:t>6,388万</a:t>
+                      </a:r>
                       <a:endParaRPr lang="en-US" sz="1000" dirty="0">
                         <a:latin typeface="Meiryo UI" charset="0"/>
                         <a:ea typeface="Meiryo UI" charset="0"/>
@@ -20320,7 +20988,7 @@
                 <a:ea typeface="Meiryo UI" pitchFamily="34" charset="-122"/>
                 <a:cs typeface="Meiryo UI" pitchFamily="34" charset="-120"/>
               </a:rPr>
-              <a:t>✓  生成AIサービス導入が最大成長カテゴリ（10→46→58件）。SaaS型の導入が主流化</a:t>
+              <a:t>✓  ④構築全体の中央値は376万円（平均6,388万はNEDO等の大型R&amp;Dで上振れ）。NTTDXPNの主戦場はMedium帯</a:t>
             </a:r>
             <a:endParaRPr lang="en-US" sz="1000" dirty="0"/>
           </a:p>
@@ -20340,7 +21008,7 @@
                 <a:ea typeface="Meiryo UI" pitchFamily="34" charset="-122"/>
                 <a:cs typeface="Meiryo UI" pitchFamily="34" charset="-120"/>
               </a:rPr>
-              <a:t>✓  RAG構築（11→16→24件）は技術力が差別化要因。NTTグループの強み活用可能</a:t>
+              <a:t>✓  生成AIサービス導入が最大成長カテゴリ（10→46→58件）。中央値428万でSaaS型が主流</a:t>
             </a:r>
             <a:endParaRPr lang="en-US" sz="1000" dirty="0"/>
           </a:p>
@@ -20360,7 +21028,7 @@
                 <a:ea typeface="Meiryo UI" pitchFamily="34" charset="-122"/>
                 <a:cs typeface="Meiryo UI" pitchFamily="34" charset="-120"/>
               </a:rPr>
-              <a:t>✓  活用支援・コンサル / 教育・学校AI は件数少ないが平均単価2,000万超の高単価領域</a:t>
+              <a:t>✓  教育・学校AI は中央値3,960万の高単価領域。RAG構築は技術差別化で勝負</a:t>
             </a:r>
             <a:endParaRPr lang="en-US" sz="1000" dirty="0"/>
           </a:p>

</xml_diff>

<commit_message>
vault backup: 2026-02-18 12:46:20
</commit_message>
<xml_diff>
--- a/05_Output/Projects/@Active/NTTDX-Customer-Expansion-Mission/02-materials/FY2026-公共セクター生成AI案件-フェーズ別見通し.pptx
+++ b/05_Output/Projects/@Active/NTTDX-Customer-Expansion-Mission/02-materials/FY2026-公共セクター生成AI案件-フェーズ別見通し.pptx
@@ -11745,7 +11745,7 @@
                 <a:ea typeface="Meiryo UI" pitchFamily="34" charset="-122"/>
                 <a:cs typeface="Meiryo UI" pitchFamily="34" charset="-120"/>
               </a:rPr>
-              <a:t>*FY2025④構築にはNEDO大型R&amp;D案件（149.7億等）を含む。中央値: ④構築376万 / ⑤運用341万 / ③PoC1,723万（平均は大型案件で大幅上振れ）</a:t>
+              <a:t>*FY2025④構築にはNEDO大型R&amp;D案件（149.7億等）を含む。中央値: ④構築475万 / ⑤運用346万 / ③PoC1,749万（平均は大型案件で大幅上振れ）</a:t>
             </a:r>
             <a:endParaRPr lang="en-US" sz="800" dirty="0"/>
           </a:p>
@@ -16495,7 +16495,7 @@
                           <a:ea typeface="Meiryo UI" pitchFamily="34" charset="-122"/>
                           <a:cs typeface="Meiryo UI" pitchFamily="34" charset="-120"/>
                         </a:rPr>
-                        <a:t>215万</a:t>
+                        <a:t>490万</a:t>
                       </a:r>
                       <a:endParaRPr lang="en-US" sz="1000" dirty="0">
                         <a:latin typeface="Meiryo UI" charset="0"/>
@@ -17545,7 +17545,7 @@
                           <a:ea typeface="Meiryo UI" pitchFamily="34" charset="-122"/>
                           <a:cs typeface="Meiryo UI" pitchFamily="34" charset="-120"/>
                         </a:rPr>
-                        <a:t>772万</a:t>
+                        <a:t>785万</a:t>
                       </a:r>
                       <a:endParaRPr lang="en-US" sz="1000" dirty="0">
                         <a:latin typeface="Meiryo UI" charset="0"/>
@@ -18595,7 +18595,7 @@
                           <a:ea typeface="Meiryo UI" pitchFamily="34" charset="-122"/>
                           <a:cs typeface="Meiryo UI" pitchFamily="34" charset="-120"/>
                         </a:rPr>
-                        <a:t>182万</a:t>
+                        <a:t>245万</a:t>
                       </a:r>
                       <a:endParaRPr lang="en-US" sz="1000" dirty="0">
                         <a:latin typeface="Meiryo UI" charset="0"/>
@@ -20707,7 +20707,7 @@
                           <a:ea typeface="Meiryo UI" pitchFamily="34" charset="-122"/>
                           <a:cs typeface="Meiryo UI" pitchFamily="34" charset="-120"/>
                         </a:rPr>
-                        <a:t>376万</a:t>
+                        <a:t>475万</a:t>
                       </a:r>
                       <a:endParaRPr lang="en-US" sz="1000" dirty="0">
                         <a:latin typeface="Meiryo UI" charset="0"/>
@@ -20775,7 +20775,7 @@
                           <a:ea typeface="Meiryo UI" pitchFamily="34" charset="-122"/>
                           <a:cs typeface="Meiryo UI" pitchFamily="34" charset="-120"/>
                         </a:rPr>
-                        <a:t>6,388万</a:t>
+                        <a:t>7,058万</a:t>
                       </a:r>
                       <a:endParaRPr lang="en-US" sz="1000" dirty="0">
                         <a:latin typeface="Meiryo UI" charset="0"/>
@@ -20988,7 +20988,7 @@
                 <a:ea typeface="Meiryo UI" pitchFamily="34" charset="-122"/>
                 <a:cs typeface="Meiryo UI" pitchFamily="34" charset="-120"/>
               </a:rPr>
-              <a:t>✓  ④構築全体の中央値は376万円（平均6,388万はNEDO等の大型R&amp;Dで上振れ）。NTTDXPNの主戦場はMedium帯</a:t>
+              <a:t>✓  ④構築全体の中央値は475万円（平均7,058万はNEDO等の大型R&amp;Dで上振れ）。NTTDXPNの主戦場はMedium帯</a:t>
             </a:r>
             <a:endParaRPr lang="en-US" sz="1000" dirty="0"/>
           </a:p>
@@ -21028,7 +21028,7 @@
                 <a:ea typeface="Meiryo UI" pitchFamily="34" charset="-122"/>
                 <a:cs typeface="Meiryo UI" pitchFamily="34" charset="-120"/>
               </a:rPr>
-              <a:t>✓  教育・学校AI は中央値3,960万の高単価領域。RAG構築は技術差別化で勝負</a:t>
+              <a:t>✓  教育・学校AI は中央値3,960万の高単価領域。RAG構築（中央値245万）は技術差別化で勝負</a:t>
             </a:r>
             <a:endParaRPr lang="en-US" sz="1000" dirty="0"/>
           </a:p>

</xml_diff>

<commit_message>
vault backup: 2026-02-24 12:10:45
</commit_message>
<xml_diff>
--- a/05_Output/Projects/@Active/NTTDX-Customer-Expansion-Mission/02-materials/FY2026-公共セクター生成AI案件-フェーズ別見通し.pptx
+++ b/05_Output/Projects/@Active/NTTDX-Customer-Expansion-Mission/02-materials/FY2026-公共セクター生成AI案件-フェーズ別見通し.pptx
@@ -1728,7 +1728,7 @@
                 <a:ea typeface="Meiryo UI" pitchFamily="34" charset="-122"/>
                 <a:cs typeface="Meiryo UI" pitchFamily="34" charset="-120"/>
               </a:rPr>
-              <a:t>入札キング2,500件分析 + 個別案件調査に基づく市場見通し</a:t>
+              <a:t>入札キング2,507件分析 + 個別案件調査に基づく市場見通し</a:t>
             </a:r>
             <a:endParaRPr lang="en-US" sz="1600" dirty="0"/>
           </a:p>
@@ -1767,7 +1767,7 @@
                 <a:ea typeface="Meiryo UI" pitchFamily="34" charset="-122"/>
                 <a:cs typeface="Meiryo UI" pitchFamily="34" charset="-120"/>
               </a:rPr>
-              <a:t>2026年2月18日</a:t>
+              <a:t>2026年2月24日</a:t>
             </a:r>
             <a:endParaRPr lang="en-US" sz="1200" dirty="0"/>
           </a:p>
@@ -2014,7 +2014,7 @@
                 <a:ea typeface="Meiryo UI" pitchFamily="34" charset="-122"/>
                 <a:cs typeface="Meiryo UI" pitchFamily="34" charset="-120"/>
               </a:rPr>
-              <a:t>231件</a:t>
+              <a:t>246件</a:t>
             </a:r>
             <a:endParaRPr lang="en-US" sz="2800" dirty="0"/>
           </a:p>
@@ -2053,7 +2053,7 @@
                 <a:ea typeface="Meiryo UI" pitchFamily="34" charset="-122"/>
                 <a:cs typeface="Meiryo UI" pitchFamily="34" charset="-120"/>
               </a:rPr>
-              <a:t>46.9億円</a:t>
+              <a:t>67.9億円</a:t>
             </a:r>
             <a:endParaRPr lang="en-US" sz="1400" dirty="0"/>
           </a:p>
@@ -2217,7 +2217,7 @@
                 <a:ea typeface="Meiryo UI" pitchFamily="34" charset="-122"/>
                 <a:cs typeface="Meiryo UI" pitchFamily="34" charset="-120"/>
               </a:rPr>
-              <a:t>+98%</a:t>
+              <a:t>+90%</a:t>
             </a:r>
             <a:endParaRPr lang="en-US" sz="1200" dirty="0"/>
           </a:p>
@@ -2256,7 +2256,7 @@
                 <a:ea typeface="Meiryo UI" pitchFamily="34" charset="-122"/>
                 <a:cs typeface="Meiryo UI" pitchFamily="34" charset="-120"/>
               </a:rPr>
-              <a:t>457件</a:t>
+              <a:t>468件</a:t>
             </a:r>
             <a:endParaRPr lang="en-US" sz="2800" dirty="0"/>
           </a:p>
@@ -2295,7 +2295,7 @@
                 <a:ea typeface="Meiryo UI" pitchFamily="34" charset="-122"/>
                 <a:cs typeface="Meiryo UI" pitchFamily="34" charset="-120"/>
               </a:rPr>
-              <a:t>102.8億円</a:t>
+              <a:t>90.7億円</a:t>
             </a:r>
             <a:endParaRPr lang="en-US" sz="1400" dirty="0"/>
           </a:p>
@@ -2459,7 +2459,7 @@
                 <a:ea typeface="Meiryo UI" pitchFamily="34" charset="-122"/>
                 <a:cs typeface="Meiryo UI" pitchFamily="34" charset="-120"/>
               </a:rPr>
-              <a:t>+8%</a:t>
+              <a:t>+14%</a:t>
             </a:r>
             <a:endParaRPr lang="en-US" sz="1200" dirty="0"/>
           </a:p>
@@ -2498,7 +2498,7 @@
                 <a:ea typeface="Meiryo UI" pitchFamily="34" charset="-122"/>
                 <a:cs typeface="Meiryo UI" pitchFamily="34" charset="-120"/>
               </a:rPr>
-              <a:t>495件</a:t>
+              <a:t>533件</a:t>
             </a:r>
             <a:endParaRPr lang="en-US" sz="2800" dirty="0"/>
           </a:p>
@@ -2537,7 +2537,7 @@
                 <a:ea typeface="Meiryo UI" pitchFamily="34" charset="-122"/>
                 <a:cs typeface="Meiryo UI" pitchFamily="34" charset="-120"/>
               </a:rPr>
-              <a:t>225.1億円*</a:t>
+              <a:t>233.0億円*</a:t>
             </a:r>
             <a:endParaRPr lang="en-US" sz="1400" dirty="0"/>
           </a:p>
@@ -3144,7 +3144,7 @@
                           <a:ea typeface="Meiryo UI" pitchFamily="34" charset="-122"/>
                           <a:cs typeface="Meiryo UI" pitchFamily="34" charset="-120"/>
                         </a:rPr>
-                        <a:t>43</a:t>
+                        <a:t>46</a:t>
                       </a:r>
                       <a:endParaRPr lang="en-US" sz="1000" dirty="0">
                         <a:latin typeface="Meiryo UI" charset="0"/>
@@ -3209,7 +3209,7 @@
                           <a:ea typeface="Meiryo UI" pitchFamily="34" charset="-122"/>
                           <a:cs typeface="Meiryo UI" pitchFamily="34" charset="-120"/>
                         </a:rPr>
-                        <a:t>80</a:t>
+                        <a:t>91</a:t>
                       </a:r>
                       <a:endParaRPr lang="en-US" sz="1000" dirty="0">
                         <a:latin typeface="Meiryo UI" charset="0"/>
@@ -3274,7 +3274,7 @@
                           <a:ea typeface="Meiryo UI" pitchFamily="34" charset="-122"/>
                           <a:cs typeface="Meiryo UI" pitchFamily="34" charset="-120"/>
                         </a:rPr>
-                        <a:t>106</a:t>
+                        <a:t>117</a:t>
                       </a:r>
                       <a:endParaRPr lang="en-US" sz="1000" dirty="0">
                         <a:latin typeface="Meiryo UI" charset="0"/>
@@ -3342,7 +3342,7 @@
                           <a:ea typeface="Meiryo UI" pitchFamily="34" charset="-122"/>
                           <a:cs typeface="Meiryo UI" pitchFamily="34" charset="-120"/>
                         </a:rPr>
-                        <a:t>229</a:t>
+                        <a:t>254</a:t>
                       </a:r>
                       <a:endParaRPr lang="en-US" sz="1000" dirty="0">
                         <a:latin typeface="Meiryo UI" charset="0"/>
@@ -3407,7 +3407,7 @@
                           <a:ea typeface="Meiryo UI" pitchFamily="34" charset="-122"/>
                           <a:cs typeface="Meiryo UI" pitchFamily="34" charset="-120"/>
                         </a:rPr>
-                        <a:t>19%</a:t>
+                        <a:t>20%</a:t>
                       </a:r>
                       <a:endParaRPr lang="en-US" sz="1000" dirty="0">
                         <a:latin typeface="Meiryo UI" charset="0"/>
@@ -3539,7 +3539,7 @@
                           <a:ea typeface="Meiryo UI" pitchFamily="34" charset="-122"/>
                           <a:cs typeface="Meiryo UI" pitchFamily="34" charset="-120"/>
                         </a:rPr>
-                        <a:t>67</a:t>
+                        <a:t>64</a:t>
                       </a:r>
                       <a:endParaRPr lang="en-US" sz="1000" dirty="0">
                         <a:latin typeface="Meiryo UI" charset="0"/>
@@ -3604,7 +3604,7 @@
                           <a:ea typeface="Meiryo UI" pitchFamily="34" charset="-122"/>
                           <a:cs typeface="Meiryo UI" pitchFamily="34" charset="-120"/>
                         </a:rPr>
-                        <a:t>143</a:t>
+                        <a:t>138</a:t>
                       </a:r>
                       <a:endParaRPr lang="en-US" sz="1000" dirty="0">
                         <a:latin typeface="Meiryo UI" charset="0"/>
@@ -3669,7 +3669,7 @@
                           <a:ea typeface="Meiryo UI" pitchFamily="34" charset="-122"/>
                           <a:cs typeface="Meiryo UI" pitchFamily="34" charset="-120"/>
                         </a:rPr>
-                        <a:t>149</a:t>
+                        <a:t>158</a:t>
                       </a:r>
                       <a:endParaRPr lang="en-US" sz="1000" dirty="0">
                         <a:latin typeface="Meiryo UI" charset="0"/>
@@ -3737,7 +3737,7 @@
                           <a:ea typeface="Meiryo UI" pitchFamily="34" charset="-122"/>
                           <a:cs typeface="Meiryo UI" pitchFamily="34" charset="-120"/>
                         </a:rPr>
-                        <a:t>359</a:t>
+                        <a:t>360</a:t>
                       </a:r>
                       <a:endParaRPr lang="en-US" sz="1000" dirty="0">
                         <a:latin typeface="Meiryo UI" charset="0"/>
@@ -3802,7 +3802,7 @@
                           <a:ea typeface="Meiryo UI" pitchFamily="34" charset="-122"/>
                           <a:cs typeface="Meiryo UI" pitchFamily="34" charset="-120"/>
                         </a:rPr>
-                        <a:t>30%</a:t>
+                        <a:t>29%</a:t>
                       </a:r>
                       <a:endParaRPr lang="en-US" sz="1000" dirty="0">
                         <a:latin typeface="Meiryo UI" charset="0"/>
@@ -3934,7 +3934,7 @@
                           <a:ea typeface="Meiryo UI" pitchFamily="34" charset="-122"/>
                           <a:cs typeface="Meiryo UI" pitchFamily="34" charset="-120"/>
                         </a:rPr>
-                        <a:t>28</a:t>
+                        <a:t>34</a:t>
                       </a:r>
                       <a:endParaRPr lang="en-US" sz="1000" dirty="0">
                         <a:latin typeface="Meiryo UI" charset="0"/>
@@ -3999,7 +3999,7 @@
                           <a:ea typeface="Meiryo UI" pitchFamily="34" charset="-122"/>
                           <a:cs typeface="Meiryo UI" pitchFamily="34" charset="-120"/>
                         </a:rPr>
-                        <a:t>73</a:t>
+                        <a:t>74</a:t>
                       </a:r>
                       <a:endParaRPr lang="en-US" sz="1000" dirty="0">
                         <a:latin typeface="Meiryo UI" charset="0"/>
@@ -4064,7 +4064,7 @@
                           <a:ea typeface="Meiryo UI" pitchFamily="34" charset="-122"/>
                           <a:cs typeface="Meiryo UI" pitchFamily="34" charset="-120"/>
                         </a:rPr>
-                        <a:t>85</a:t>
+                        <a:t>98</a:t>
                       </a:r>
                       <a:endParaRPr lang="en-US" sz="1000" dirty="0">
                         <a:latin typeface="Meiryo UI" charset="0"/>
@@ -4132,7 +4132,7 @@
                           <a:ea typeface="Meiryo UI" pitchFamily="34" charset="-122"/>
                           <a:cs typeface="Meiryo UI" pitchFamily="34" charset="-120"/>
                         </a:rPr>
-                        <a:t>186</a:t>
+                        <a:t>206</a:t>
                       </a:r>
                       <a:endParaRPr lang="en-US" sz="1000" dirty="0">
                         <a:latin typeface="Meiryo UI" charset="0"/>
@@ -4197,7 +4197,7 @@
                           <a:ea typeface="Meiryo UI" pitchFamily="34" charset="-122"/>
                           <a:cs typeface="Meiryo UI" pitchFamily="34" charset="-120"/>
                         </a:rPr>
-                        <a:t>16%</a:t>
+                        <a:t>17%</a:t>
                       </a:r>
                       <a:endParaRPr lang="en-US" sz="1000" dirty="0">
                         <a:latin typeface="Meiryo UI" charset="0"/>
@@ -4329,7 +4329,7 @@
                           <a:ea typeface="Meiryo UI" pitchFamily="34" charset="-122"/>
                           <a:cs typeface="Meiryo UI" pitchFamily="34" charset="-120"/>
                         </a:rPr>
-                        <a:t>61</a:t>
+                        <a:t>65</a:t>
                       </a:r>
                       <a:endParaRPr lang="en-US" sz="1000" dirty="0">
                         <a:latin typeface="Meiryo UI" charset="0"/>
@@ -4394,7 +4394,7 @@
                           <a:ea typeface="Meiryo UI" pitchFamily="34" charset="-122"/>
                           <a:cs typeface="Meiryo UI" pitchFamily="34" charset="-120"/>
                         </a:rPr>
-                        <a:t>117</a:t>
+                        <a:t>120</a:t>
                       </a:r>
                       <a:endParaRPr lang="en-US" sz="1000" dirty="0">
                         <a:latin typeface="Meiryo UI" charset="0"/>
@@ -4459,7 +4459,7 @@
                           <a:ea typeface="Meiryo UI" pitchFamily="34" charset="-122"/>
                           <a:cs typeface="Meiryo UI" pitchFamily="34" charset="-120"/>
                         </a:rPr>
-                        <a:t>108</a:t>
+                        <a:t>112</a:t>
                       </a:r>
                       <a:endParaRPr lang="en-US" sz="1000" dirty="0">
                         <a:latin typeface="Meiryo UI" charset="0"/>
@@ -4527,7 +4527,7 @@
                           <a:ea typeface="Meiryo UI" pitchFamily="34" charset="-122"/>
                           <a:cs typeface="Meiryo UI" pitchFamily="34" charset="-120"/>
                         </a:rPr>
-                        <a:t>286</a:t>
+                        <a:t>297</a:t>
                       </a:r>
                       <a:endParaRPr lang="en-US" sz="1000" dirty="0">
                         <a:latin typeface="Meiryo UI" charset="0"/>
@@ -4724,7 +4724,7 @@
                           <a:ea typeface="Meiryo UI" pitchFamily="34" charset="-122"/>
                           <a:cs typeface="Meiryo UI" pitchFamily="34" charset="-120"/>
                         </a:rPr>
-                        <a:t>32</a:t>
+                        <a:t>37</a:t>
                       </a:r>
                       <a:endParaRPr lang="en-US" sz="1000" dirty="0">
                         <a:latin typeface="Meiryo UI" charset="0"/>
@@ -4789,7 +4789,7 @@
                           <a:ea typeface="Meiryo UI" pitchFamily="34" charset="-122"/>
                           <a:cs typeface="Meiryo UI" pitchFamily="34" charset="-120"/>
                         </a:rPr>
-                        <a:t>44</a:t>
+                        <a:t>45</a:t>
                       </a:r>
                       <a:endParaRPr lang="en-US" sz="1000" dirty="0">
                         <a:latin typeface="Meiryo UI" charset="0"/>
@@ -4854,7 +4854,7 @@
                           <a:ea typeface="Meiryo UI" pitchFamily="34" charset="-122"/>
                           <a:cs typeface="Meiryo UI" pitchFamily="34" charset="-120"/>
                         </a:rPr>
-                        <a:t>47</a:t>
+                        <a:t>48</a:t>
                       </a:r>
                       <a:endParaRPr lang="en-US" sz="1000" dirty="0">
                         <a:latin typeface="Meiryo UI" charset="0"/>
@@ -4922,7 +4922,7 @@
                           <a:ea typeface="Meiryo UI" pitchFamily="34" charset="-122"/>
                           <a:cs typeface="Meiryo UI" pitchFamily="34" charset="-120"/>
                         </a:rPr>
-                        <a:t>123</a:t>
+                        <a:t>130</a:t>
                       </a:r>
                       <a:endParaRPr lang="en-US" sz="1000" dirty="0">
                         <a:latin typeface="Meiryo UI" charset="0"/>
@@ -5122,7 +5122,7 @@
                           <a:ea typeface="Meiryo UI" pitchFamily="34" charset="-122"/>
                           <a:cs typeface="Meiryo UI" pitchFamily="34" charset="-120"/>
                         </a:rPr>
-                        <a:t>231</a:t>
+                        <a:t>246</a:t>
                       </a:r>
                       <a:endParaRPr lang="en-US" sz="1000" dirty="0">
                         <a:latin typeface="Meiryo UI" charset="0"/>
@@ -5190,7 +5190,7 @@
                           <a:ea typeface="Meiryo UI" pitchFamily="34" charset="-122"/>
                           <a:cs typeface="Meiryo UI" pitchFamily="34" charset="-120"/>
                         </a:rPr>
-                        <a:t>457</a:t>
+                        <a:t>468</a:t>
                       </a:r>
                       <a:endParaRPr lang="en-US" sz="1000" dirty="0">
                         <a:latin typeface="Meiryo UI" charset="0"/>
@@ -5258,7 +5258,7 @@
                           <a:ea typeface="Meiryo UI" pitchFamily="34" charset="-122"/>
                           <a:cs typeface="Meiryo UI" pitchFamily="34" charset="-120"/>
                         </a:rPr>
-                        <a:t>495</a:t>
+                        <a:t>533</a:t>
                       </a:r>
                       <a:endParaRPr lang="en-US" sz="1000" dirty="0">
                         <a:latin typeface="Meiryo UI" charset="0"/>
@@ -5326,7 +5326,7 @@
                           <a:ea typeface="Meiryo UI" pitchFamily="34" charset="-122"/>
                           <a:cs typeface="Meiryo UI" pitchFamily="34" charset="-120"/>
                         </a:rPr>
-                        <a:t>1,183</a:t>
+                        <a:t>1,247</a:t>
                       </a:r>
                       <a:endParaRPr lang="en-US" sz="1000" dirty="0">
                         <a:latin typeface="Meiryo UI" charset="0"/>
@@ -5542,7 +5542,7 @@
                 <a:ea typeface="Meiryo UI" pitchFamily="34" charset="-122"/>
                 <a:cs typeface="Meiryo UI" pitchFamily="34" charset="-120"/>
               </a:rPr>
-              <a:t>50%</a:t>
+              <a:t>49%</a:t>
             </a:r>
             <a:endParaRPr lang="en-US" sz="1400" dirty="0"/>
           </a:p>
@@ -5581,7 +5581,7 @@
                 <a:ea typeface="Meiryo UI" pitchFamily="34" charset="-122"/>
                 <a:cs typeface="Meiryo UI" pitchFamily="34" charset="-120"/>
               </a:rPr>
-              <a:t>588件</a:t>
+              <a:t>614件</a:t>
             </a:r>
             <a:endParaRPr lang="en-US" sz="1000" dirty="0"/>
           </a:p>
@@ -5780,7 +5780,7 @@
                 <a:ea typeface="Meiryo UI" pitchFamily="34" charset="-122"/>
                 <a:cs typeface="Meiryo UI" pitchFamily="34" charset="-120"/>
               </a:rPr>
-              <a:t>472件</a:t>
+              <a:t>503件</a:t>
             </a:r>
             <a:endParaRPr lang="en-US" sz="1000" dirty="0"/>
           </a:p>
@@ -5979,7 +5979,7 @@
                 <a:ea typeface="Meiryo UI" pitchFamily="34" charset="-122"/>
                 <a:cs typeface="Meiryo UI" pitchFamily="34" charset="-120"/>
               </a:rPr>
-              <a:t>123件</a:t>
+              <a:t>130件</a:t>
             </a:r>
             <a:endParaRPr lang="en-US" sz="1000" dirty="0"/>
           </a:p>
@@ -6696,7 +6696,7 @@
                           <a:ea typeface="Meiryo UI" pitchFamily="34" charset="-122"/>
                           <a:cs typeface="Meiryo UI" pitchFamily="34" charset="-120"/>
                         </a:rPr>
-                        <a:t>5</a:t>
+                        <a:t>3</a:t>
                       </a:r>
                       <a:endParaRPr lang="en-US" sz="1000" dirty="0">
                         <a:latin typeface="Meiryo UI" charset="0"/>
@@ -6761,7 +6761,7 @@
                           <a:ea typeface="Meiryo UI" pitchFamily="34" charset="-122"/>
                           <a:cs typeface="Meiryo UI" pitchFamily="34" charset="-120"/>
                         </a:rPr>
-                        <a:t>17</a:t>
+                        <a:t>15</a:t>
                       </a:r>
                       <a:endParaRPr lang="en-US" sz="1000" dirty="0">
                         <a:latin typeface="Meiryo UI" charset="0"/>
@@ -6826,7 +6826,7 @@
                           <a:ea typeface="Meiryo UI" pitchFamily="34" charset="-122"/>
                           <a:cs typeface="Meiryo UI" pitchFamily="34" charset="-120"/>
                         </a:rPr>
-                        <a:t>23</a:t>
+                        <a:t>19</a:t>
                       </a:r>
                       <a:endParaRPr lang="en-US" sz="1000" dirty="0">
                         <a:latin typeface="Meiryo UI" charset="0"/>
@@ -6894,7 +6894,7 @@
                           <a:ea typeface="Meiryo UI" pitchFamily="34" charset="-122"/>
                           <a:cs typeface="Meiryo UI" pitchFamily="34" charset="-120"/>
                         </a:rPr>
-                        <a:t>+240%</a:t>
+                        <a:t>+400%</a:t>
                       </a:r>
                       <a:endParaRPr lang="en-US" sz="1000" dirty="0">
                         <a:latin typeface="Meiryo UI" charset="0"/>
@@ -6959,7 +6959,7 @@
                           <a:ea typeface="Meiryo UI" pitchFamily="34" charset="-122"/>
                           <a:cs typeface="Meiryo UI" pitchFamily="34" charset="-120"/>
                         </a:rPr>
-                        <a:t>+35%</a:t>
+                        <a:t>+27%</a:t>
                       </a:r>
                       <a:endParaRPr lang="en-US" sz="1000" dirty="0">
                         <a:latin typeface="Meiryo UI" charset="0"/>
@@ -7616,7 +7616,7 @@
                           <a:ea typeface="Meiryo UI" pitchFamily="34" charset="-122"/>
                           <a:cs typeface="Meiryo UI" pitchFamily="34" charset="-120"/>
                         </a:rPr>
-                        <a:t>20</a:t>
+                        <a:t>21</a:t>
                       </a:r>
                       <a:endParaRPr lang="en-US" sz="1000" dirty="0">
                         <a:latin typeface="Meiryo UI" charset="0"/>
@@ -7746,7 +7746,7 @@
                           <a:ea typeface="Meiryo UI" pitchFamily="34" charset="-122"/>
                           <a:cs typeface="Meiryo UI" pitchFamily="34" charset="-120"/>
                         </a:rPr>
-                        <a:t>33</a:t>
+                        <a:t>44</a:t>
                       </a:r>
                       <a:endParaRPr lang="en-US" sz="1000" dirty="0">
                         <a:latin typeface="Meiryo UI" charset="0"/>
@@ -7814,7 +7814,7 @@
                           <a:ea typeface="Meiryo UI" pitchFamily="34" charset="-122"/>
                           <a:cs typeface="Meiryo UI" pitchFamily="34" charset="-120"/>
                         </a:rPr>
-                        <a:t>+165%</a:t>
+                        <a:t>+152%</a:t>
                       </a:r>
                       <a:endParaRPr lang="en-US" sz="1000" dirty="0">
                         <a:latin typeface="Meiryo UI" charset="0"/>
@@ -7879,7 +7879,7 @@
                           <a:ea typeface="Meiryo UI" pitchFamily="34" charset="-122"/>
                           <a:cs typeface="Meiryo UI" pitchFamily="34" charset="-120"/>
                         </a:rPr>
-                        <a:t>-38%</a:t>
+                        <a:t>-17%</a:t>
                       </a:r>
                       <a:endParaRPr lang="en-US" sz="1000" dirty="0">
                         <a:latin typeface="Meiryo UI" charset="0"/>
@@ -8076,7 +8076,7 @@
                           <a:ea typeface="Meiryo UI" pitchFamily="34" charset="-122"/>
                           <a:cs typeface="Meiryo UI" pitchFamily="34" charset="-120"/>
                         </a:rPr>
-                        <a:t>148</a:t>
+                        <a:t>161</a:t>
                       </a:r>
                       <a:endParaRPr lang="en-US" sz="1000" dirty="0">
                         <a:latin typeface="Meiryo UI" charset="0"/>
@@ -8141,7 +8141,7 @@
                           <a:ea typeface="Meiryo UI" pitchFamily="34" charset="-122"/>
                           <a:cs typeface="Meiryo UI" pitchFamily="34" charset="-120"/>
                         </a:rPr>
-                        <a:t>291</a:t>
+                        <a:t>295</a:t>
                       </a:r>
                       <a:endParaRPr lang="en-US" sz="1000" dirty="0">
                         <a:latin typeface="Meiryo UI" charset="0"/>
@@ -8206,7 +8206,7 @@
                           <a:ea typeface="Meiryo UI" pitchFamily="34" charset="-122"/>
                           <a:cs typeface="Meiryo UI" pitchFamily="34" charset="-120"/>
                         </a:rPr>
-                        <a:t>315</a:t>
+                        <a:t>339</a:t>
                       </a:r>
                       <a:endParaRPr lang="en-US" sz="1000" dirty="0">
                         <a:latin typeface="Meiryo UI" charset="0"/>
@@ -8274,7 +8274,7 @@
                           <a:ea typeface="Meiryo UI" pitchFamily="34" charset="-122"/>
                           <a:cs typeface="Meiryo UI" pitchFamily="34" charset="-120"/>
                         </a:rPr>
-                        <a:t>+97%</a:t>
+                        <a:t>+83%</a:t>
                       </a:r>
                       <a:endParaRPr lang="en-US" sz="1000" dirty="0">
                         <a:latin typeface="Meiryo UI" charset="0"/>
@@ -8339,7 +8339,7 @@
                           <a:ea typeface="Meiryo UI" pitchFamily="34" charset="-122"/>
                           <a:cs typeface="Meiryo UI" pitchFamily="34" charset="-120"/>
                         </a:rPr>
-                        <a:t>+8%</a:t>
+                        <a:t>+15%</a:t>
                       </a:r>
                       <a:endParaRPr lang="en-US" sz="1000" dirty="0">
                         <a:latin typeface="Meiryo UI" charset="0"/>
@@ -8536,7 +8536,7 @@
                           <a:ea typeface="Meiryo UI" pitchFamily="34" charset="-122"/>
                           <a:cs typeface="Meiryo UI" pitchFamily="34" charset="-120"/>
                         </a:rPr>
-                        <a:t>52</a:t>
+                        <a:t>55</a:t>
                       </a:r>
                       <a:endParaRPr lang="en-US" sz="1000" dirty="0">
                         <a:latin typeface="Meiryo UI" charset="0"/>
@@ -8601,7 +8601,7 @@
                           <a:ea typeface="Meiryo UI" pitchFamily="34" charset="-122"/>
                           <a:cs typeface="Meiryo UI" pitchFamily="34" charset="-120"/>
                         </a:rPr>
-                        <a:t>87</a:t>
+                        <a:t>96</a:t>
                       </a:r>
                       <a:endParaRPr lang="en-US" sz="1000" dirty="0">
                         <a:latin typeface="Meiryo UI" charset="0"/>
@@ -8666,7 +8666,7 @@
                           <a:ea typeface="Meiryo UI" pitchFamily="34" charset="-122"/>
                           <a:cs typeface="Meiryo UI" pitchFamily="34" charset="-120"/>
                         </a:rPr>
-                        <a:t>115</a:t>
+                        <a:t>122</a:t>
                       </a:r>
                       <a:endParaRPr lang="en-US" sz="1000" dirty="0">
                         <a:latin typeface="Meiryo UI" charset="0"/>
@@ -8734,7 +8734,7 @@
                           <a:ea typeface="Meiryo UI" pitchFamily="34" charset="-122"/>
                           <a:cs typeface="Meiryo UI" pitchFamily="34" charset="-120"/>
                         </a:rPr>
-                        <a:t>+67%</a:t>
+                        <a:t>+75%</a:t>
                       </a:r>
                       <a:endParaRPr lang="en-US" sz="1000" dirty="0">
                         <a:latin typeface="Meiryo UI" charset="0"/>
@@ -8799,7 +8799,7 @@
                           <a:ea typeface="Meiryo UI" pitchFamily="34" charset="-122"/>
                           <a:cs typeface="Meiryo UI" pitchFamily="34" charset="-120"/>
                         </a:rPr>
-                        <a:t>+32%</a:t>
+                        <a:t>+27%</a:t>
                       </a:r>
                       <a:endParaRPr lang="en-US" sz="1000" dirty="0">
                         <a:latin typeface="Meiryo UI" charset="0"/>
@@ -8999,7 +8999,7 @@
                           <a:ea typeface="Meiryo UI" pitchFamily="34" charset="-122"/>
                           <a:cs typeface="Meiryo UI" pitchFamily="34" charset="-120"/>
                         </a:rPr>
-                        <a:t>231</a:t>
+                        <a:t>246</a:t>
                       </a:r>
                       <a:endParaRPr lang="en-US" sz="1000" dirty="0">
                         <a:latin typeface="Meiryo UI" charset="0"/>
@@ -9067,7 +9067,7 @@
                           <a:ea typeface="Meiryo UI" pitchFamily="34" charset="-122"/>
                           <a:cs typeface="Meiryo UI" pitchFamily="34" charset="-120"/>
                         </a:rPr>
-                        <a:t>457</a:t>
+                        <a:t>468</a:t>
                       </a:r>
                       <a:endParaRPr lang="en-US" sz="1000" dirty="0">
                         <a:latin typeface="Meiryo UI" charset="0"/>
@@ -9135,7 +9135,7 @@
                           <a:ea typeface="Meiryo UI" pitchFamily="34" charset="-122"/>
                           <a:cs typeface="Meiryo UI" pitchFamily="34" charset="-120"/>
                         </a:rPr>
-                        <a:t>495</a:t>
+                        <a:t>533</a:t>
                       </a:r>
                       <a:endParaRPr lang="en-US" sz="1000" dirty="0">
                         <a:latin typeface="Meiryo UI" charset="0"/>
@@ -9203,7 +9203,7 @@
                           <a:ea typeface="Meiryo UI" pitchFamily="34" charset="-122"/>
                           <a:cs typeface="Meiryo UI" pitchFamily="34" charset="-120"/>
                         </a:rPr>
-                        <a:t>+98%</a:t>
+                        <a:t>+90%</a:t>
                       </a:r>
                       <a:endParaRPr lang="en-US" sz="1000" dirty="0">
                         <a:latin typeface="Meiryo UI" charset="0"/>
@@ -9271,7 +9271,7 @@
                           <a:ea typeface="Meiryo UI" pitchFamily="34" charset="-122"/>
                           <a:cs typeface="Meiryo UI" pitchFamily="34" charset="-120"/>
                         </a:rPr>
-                        <a:t>+8%</a:t>
+                        <a:t>+14%</a:t>
                       </a:r>
                       <a:endParaRPr lang="en-US" sz="1000" dirty="0">
                         <a:latin typeface="Meiryo UI" charset="0"/>
@@ -10036,7 +10036,7 @@
                           <a:ea typeface="Meiryo UI" pitchFamily="34" charset="-122"/>
                           <a:cs typeface="Meiryo UI" pitchFamily="34" charset="-120"/>
                         </a:rPr>
-                        <a:t>(3/5件)</a:t>
+                        <a:t>(3件)</a:t>
                       </a:r>
                       <a:endParaRPr lang="en-US" sz="900" dirty="0">
                         <a:latin typeface="Meiryo UI" charset="0"/>
@@ -10208,7 +10208,7 @@
                           <a:ea typeface="Meiryo UI" pitchFamily="34" charset="-122"/>
                           <a:cs typeface="Meiryo UI" pitchFamily="34" charset="-120"/>
                         </a:rPr>
-                        <a:t>(18/20件)</a:t>
+                        <a:t>(17/21件)</a:t>
                       </a:r>
                       <a:endParaRPr lang="en-US" sz="900" dirty="0">
                         <a:latin typeface="Meiryo UI" charset="0"/>
@@ -10273,7 +10273,7 @@
                           <a:ea typeface="Meiryo UI" pitchFamily="34" charset="-122"/>
                           <a:cs typeface="Meiryo UI" pitchFamily="34" charset="-120"/>
                         </a:rPr>
-                        <a:t>36.5億</a:t>
+                        <a:t>50.3億</a:t>
                       </a:r>
                       <a:endParaRPr lang="en-US" sz="900" dirty="0">
                         <a:latin typeface="Meiryo UI" charset="0"/>
@@ -10294,7 +10294,7 @@
                           <a:ea typeface="Meiryo UI" pitchFamily="34" charset="-122"/>
                           <a:cs typeface="Meiryo UI" pitchFamily="34" charset="-120"/>
                         </a:rPr>
-                        <a:t>(86/148件)</a:t>
+                        <a:t>(94/161件)</a:t>
                       </a:r>
                       <a:endParaRPr lang="en-US" sz="900" dirty="0">
                         <a:latin typeface="Meiryo UI" charset="0"/>
@@ -10359,7 +10359,7 @@
                           <a:ea typeface="Meiryo UI" pitchFamily="34" charset="-122"/>
                           <a:cs typeface="Meiryo UI" pitchFamily="34" charset="-120"/>
                         </a:rPr>
-                        <a:t>1.7億</a:t>
+                        <a:t>8.9億</a:t>
                       </a:r>
                       <a:endParaRPr lang="en-US" sz="900" dirty="0">
                         <a:latin typeface="Meiryo UI" charset="0"/>
@@ -10380,7 +10380,7 @@
                           <a:ea typeface="Meiryo UI" pitchFamily="34" charset="-122"/>
                           <a:cs typeface="Meiryo UI" pitchFamily="34" charset="-120"/>
                         </a:rPr>
-                        <a:t>(29/52件)</a:t>
+                        <a:t>(34/55件)</a:t>
                       </a:r>
                       <a:endParaRPr lang="en-US" sz="900" dirty="0">
                         <a:latin typeface="Meiryo UI" charset="0"/>
@@ -10445,7 +10445,7 @@
                           <a:ea typeface="Meiryo UI" pitchFamily="34" charset="-122"/>
                           <a:cs typeface="Meiryo UI" pitchFamily="34" charset="-120"/>
                         </a:rPr>
-                        <a:t>46.9億</a:t>
+                        <a:t>67.9億</a:t>
                       </a:r>
                       <a:endParaRPr lang="en-US" sz="900" dirty="0">
                         <a:latin typeface="Meiryo UI" charset="0"/>
@@ -10466,7 +10466,7 @@
                           <a:ea typeface="Meiryo UI" pitchFamily="34" charset="-122"/>
                           <a:cs typeface="Meiryo UI" pitchFamily="34" charset="-120"/>
                         </a:rPr>
-                        <a:t>(136/231件)</a:t>
+                        <a:t>(148/246件)</a:t>
                       </a:r>
                       <a:endParaRPr lang="en-US" sz="900" dirty="0">
                         <a:latin typeface="Meiryo UI" charset="0"/>
@@ -10601,7 +10601,7 @@
                           <a:ea typeface="Meiryo UI" pitchFamily="34" charset="-122"/>
                           <a:cs typeface="Meiryo UI" pitchFamily="34" charset="-120"/>
                         </a:rPr>
-                        <a:t>2,787万</a:t>
+                        <a:t>2,559万</a:t>
                       </a:r>
                       <a:endParaRPr lang="en-US" sz="900" dirty="0">
                         <a:latin typeface="Meiryo UI" charset="0"/>
@@ -10622,7 +10622,7 @@
                           <a:ea typeface="Meiryo UI" pitchFamily="34" charset="-122"/>
                           <a:cs typeface="Meiryo UI" pitchFamily="34" charset="-120"/>
                         </a:rPr>
-                        <a:t>(9/17件)</a:t>
+                        <a:t>(8件)</a:t>
                       </a:r>
                       <a:endParaRPr lang="en-US" sz="900" dirty="0">
                         <a:latin typeface="Meiryo UI" charset="0"/>
@@ -10773,7 +10773,7 @@
                           <a:ea typeface="Meiryo UI" pitchFamily="34" charset="-122"/>
                           <a:cs typeface="Meiryo UI" pitchFamily="34" charset="-120"/>
                         </a:rPr>
-                        <a:t>17.8億</a:t>
+                        <a:t>12.5億</a:t>
                       </a:r>
                       <a:endParaRPr lang="en-US" sz="900" dirty="0">
                         <a:latin typeface="Meiryo UI" charset="0"/>
@@ -10794,7 +10794,7 @@
                           <a:ea typeface="Meiryo UI" pitchFamily="34" charset="-122"/>
                           <a:cs typeface="Meiryo UI" pitchFamily="34" charset="-120"/>
                         </a:rPr>
-                        <a:t>(34/53件)</a:t>
+                        <a:t>(29/53件)</a:t>
                       </a:r>
                       <a:endParaRPr lang="en-US" sz="900" dirty="0">
                         <a:latin typeface="Meiryo UI" charset="0"/>
@@ -10859,7 +10859,7 @@
                           <a:ea typeface="Meiryo UI" pitchFamily="34" charset="-122"/>
                           <a:cs typeface="Meiryo UI" pitchFamily="34" charset="-120"/>
                         </a:rPr>
-                        <a:t>68.2億</a:t>
+                        <a:t>66.7億</a:t>
                       </a:r>
                       <a:endParaRPr lang="en-US" sz="900" dirty="0">
                         <a:latin typeface="Meiryo UI" charset="0"/>
@@ -10880,7 +10880,7 @@
                           <a:ea typeface="Meiryo UI" pitchFamily="34" charset="-122"/>
                           <a:cs typeface="Meiryo UI" pitchFamily="34" charset="-120"/>
                         </a:rPr>
-                        <a:t>(147/291件)</a:t>
+                        <a:t>(145/295件)</a:t>
                       </a:r>
                       <a:endParaRPr lang="en-US" sz="900" dirty="0">
                         <a:latin typeface="Meiryo UI" charset="0"/>
@@ -10945,7 +10945,7 @@
                           <a:ea typeface="Meiryo UI" pitchFamily="34" charset="-122"/>
                           <a:cs typeface="Meiryo UI" pitchFamily="34" charset="-120"/>
                         </a:rPr>
-                        <a:t>16.4億</a:t>
+                        <a:t>11.2億</a:t>
                       </a:r>
                       <a:endParaRPr lang="en-US" sz="900" dirty="0">
                         <a:latin typeface="Meiryo UI" charset="0"/>
@@ -10966,7 +10966,7 @@
                           <a:ea typeface="Meiryo UI" pitchFamily="34" charset="-122"/>
                           <a:cs typeface="Meiryo UI" pitchFamily="34" charset="-120"/>
                         </a:rPr>
-                        <a:t>(59/87件)</a:t>
+                        <a:t>(65/96件)</a:t>
                       </a:r>
                       <a:endParaRPr lang="en-US" sz="900" dirty="0">
                         <a:latin typeface="Meiryo UI" charset="0"/>
@@ -11031,7 +11031,7 @@
                           <a:ea typeface="Meiryo UI" pitchFamily="34" charset="-122"/>
                           <a:cs typeface="Meiryo UI" pitchFamily="34" charset="-120"/>
                         </a:rPr>
-                        <a:t>102.8億</a:t>
+                        <a:t>90.7億</a:t>
                       </a:r>
                       <a:endParaRPr lang="en-US" sz="900" dirty="0">
                         <a:latin typeface="Meiryo UI" charset="0"/>
@@ -11052,7 +11052,7 @@
                           <a:ea typeface="Meiryo UI" pitchFamily="34" charset="-122"/>
                           <a:cs typeface="Meiryo UI" pitchFamily="34" charset="-120"/>
                         </a:rPr>
-                        <a:t>(249/457件)</a:t>
+                        <a:t>(247/468件)</a:t>
                       </a:r>
                       <a:endParaRPr lang="en-US" sz="900" dirty="0">
                         <a:latin typeface="Meiryo UI" charset="0"/>
@@ -11190,7 +11190,7 @@
                           <a:ea typeface="Meiryo UI" pitchFamily="34" charset="-122"/>
                           <a:cs typeface="Meiryo UI" pitchFamily="34" charset="-120"/>
                         </a:rPr>
-                        <a:t>8,880万</a:t>
+                        <a:t>2,501万</a:t>
                       </a:r>
                       <a:endParaRPr lang="en-US" sz="900" dirty="0">
                         <a:latin typeface="Meiryo UI" charset="0"/>
@@ -11211,7 +11211,7 @@
                           <a:ea typeface="Meiryo UI" pitchFamily="34" charset="-122"/>
                           <a:cs typeface="Meiryo UI" pitchFamily="34" charset="-120"/>
                         </a:rPr>
-                        <a:t>(14/23件)</a:t>
+                        <a:t>(11/19件)</a:t>
                       </a:r>
                       <a:endParaRPr lang="en-US" sz="900" dirty="0">
                         <a:latin typeface="Meiryo UI" charset="0"/>
@@ -11368,7 +11368,7 @@
                           <a:ea typeface="Meiryo UI" pitchFamily="34" charset="-122"/>
                           <a:cs typeface="Meiryo UI" pitchFamily="34" charset="-120"/>
                         </a:rPr>
-                        <a:t>4.5億</a:t>
+                        <a:t>10.0億</a:t>
                       </a:r>
                       <a:endParaRPr lang="en-US" sz="900" dirty="0">
                         <a:latin typeface="Meiryo UI" charset="0"/>
@@ -11389,7 +11389,7 @@
                           <a:ea typeface="Meiryo UI" pitchFamily="34" charset="-122"/>
                           <a:cs typeface="Meiryo UI" pitchFamily="34" charset="-120"/>
                         </a:rPr>
-                        <a:t>(17/33件)</a:t>
+                        <a:t>(26/44件)</a:t>
                       </a:r>
                       <a:endParaRPr lang="en-US" sz="900" dirty="0">
                         <a:latin typeface="Meiryo UI" charset="0"/>
@@ -11457,7 +11457,7 @@
                           <a:ea typeface="Meiryo UI" pitchFamily="34" charset="-122"/>
                           <a:cs typeface="Meiryo UI" pitchFamily="34" charset="-120"/>
                         </a:rPr>
-                        <a:t>188.6億*</a:t>
+                        <a:t>190.6億*</a:t>
                       </a:r>
                       <a:endParaRPr lang="en-US" sz="900" dirty="0">
                         <a:latin typeface="Meiryo UI" charset="0"/>
@@ -11478,7 +11478,7 @@
                           <a:ea typeface="Meiryo UI" pitchFamily="34" charset="-122"/>
                           <a:cs typeface="Meiryo UI" pitchFamily="34" charset="-120"/>
                         </a:rPr>
-                        <a:t>(147/315件)</a:t>
+                        <a:t>(156/339件)</a:t>
                       </a:r>
                       <a:endParaRPr lang="en-US" sz="900" dirty="0">
                         <a:latin typeface="Meiryo UI" charset="0"/>
@@ -11546,7 +11546,7 @@
                           <a:ea typeface="Meiryo UI" pitchFamily="34" charset="-122"/>
                           <a:cs typeface="Meiryo UI" pitchFamily="34" charset="-120"/>
                         </a:rPr>
-                        <a:t>31.2億</a:t>
+                        <a:t>32.1億</a:t>
                       </a:r>
                       <a:endParaRPr lang="en-US" sz="900" dirty="0">
                         <a:latin typeface="Meiryo UI" charset="0"/>
@@ -11567,7 +11567,7 @@
                           <a:ea typeface="Meiryo UI" pitchFamily="34" charset="-122"/>
                           <a:cs typeface="Meiryo UI" pitchFamily="34" charset="-120"/>
                         </a:rPr>
-                        <a:t>(77/115件)</a:t>
+                        <a:t>(78/122件)</a:t>
                       </a:r>
                       <a:endParaRPr lang="en-US" sz="900" dirty="0">
                         <a:latin typeface="Meiryo UI" charset="0"/>
@@ -11635,7 +11635,7 @@
                           <a:ea typeface="Meiryo UI" pitchFamily="34" charset="-122"/>
                           <a:cs typeface="Meiryo UI" pitchFamily="34" charset="-120"/>
                         </a:rPr>
-                        <a:t>225.1億</a:t>
+                        <a:t>233.0億</a:t>
                       </a:r>
                       <a:endParaRPr lang="en-US" sz="900" dirty="0">
                         <a:latin typeface="Meiryo UI" charset="0"/>
@@ -11656,7 +11656,7 @@
                           <a:ea typeface="Meiryo UI" pitchFamily="34" charset="-122"/>
                           <a:cs typeface="Meiryo UI" pitchFamily="34" charset="-120"/>
                         </a:rPr>
-                        <a:t>(255/495件)</a:t>
+                        <a:t>(271/533件)</a:t>
                       </a:r>
                       <a:endParaRPr lang="en-US" sz="900" dirty="0">
                         <a:latin typeface="Meiryo UI" charset="0"/>
@@ -11745,7 +11745,7 @@
                 <a:ea typeface="Meiryo UI" pitchFamily="34" charset="-122"/>
                 <a:cs typeface="Meiryo UI" pitchFamily="34" charset="-120"/>
               </a:rPr>
-              <a:t>*FY2025④構築にはNEDO大型R&amp;D案件（149.7億等）を含む。中央値: ④構築475万 / ⑤運用346万 / ③PoC1,749万（平均は大型案件で大幅上振れ）</a:t>
+              <a:t>*FY2025④構築にはNEDO大型R&amp;D案件（149.7億等）を含む。中央値: ④構築494万 / ⑤運用352万 / ③PoC1,370万（平均は大型案件で大幅上振れ）</a:t>
             </a:r>
             <a:endParaRPr lang="en-US" sz="800" dirty="0"/>
           </a:p>
@@ -12414,7 +12414,7 @@
                 <a:ea typeface="Meiryo UI" pitchFamily="34" charset="-122"/>
                 <a:cs typeface="Meiryo UI" pitchFamily="34" charset="-120"/>
               </a:rPr>
-              <a:t>~594件</a:t>
+              <a:t>~639件</a:t>
             </a:r>
             <a:endParaRPr lang="en-US" sz="2200" dirty="0"/>
           </a:p>
@@ -12453,7 +12453,7 @@
                 <a:ea typeface="Meiryo UI" pitchFamily="34" charset="-122"/>
                 <a:cs typeface="Meiryo UI" pitchFamily="34" charset="-120"/>
               </a:rPr>
-              <a:t>自治体~300件</a:t>
+              <a:t>自治体~320件</a:t>
             </a:r>
             <a:endParaRPr lang="en-US" sz="1000" dirty="0"/>
           </a:p>
@@ -12492,7 +12492,7 @@
                 <a:ea typeface="Meiryo UI" pitchFamily="34" charset="-122"/>
                 <a:cs typeface="Meiryo UI" pitchFamily="34" charset="-120"/>
               </a:rPr>
-              <a:t>国独法~240件</a:t>
+              <a:t>国独法~255件</a:t>
             </a:r>
             <a:endParaRPr lang="en-US" sz="1000" dirty="0"/>
           </a:p>
@@ -12693,7 +12693,7 @@
                 <a:ea typeface="Meiryo UI" pitchFamily="34" charset="-122"/>
                 <a:cs typeface="Meiryo UI" pitchFamily="34" charset="-120"/>
               </a:rPr>
-              <a:t>~648件</a:t>
+              <a:t>~697件</a:t>
             </a:r>
             <a:endParaRPr lang="en-US" sz="2200" dirty="0"/>
           </a:p>
@@ -12732,7 +12732,7 @@
                 <a:ea typeface="Meiryo UI" pitchFamily="34" charset="-122"/>
                 <a:cs typeface="Meiryo UI" pitchFamily="34" charset="-120"/>
               </a:rPr>
-              <a:t>自治体~330件</a:t>
+              <a:t>自治体~350件</a:t>
             </a:r>
             <a:endParaRPr lang="en-US" sz="1000" dirty="0"/>
           </a:p>
@@ -12771,7 +12771,7 @@
                 <a:ea typeface="Meiryo UI" pitchFamily="34" charset="-122"/>
                 <a:cs typeface="Meiryo UI" pitchFamily="34" charset="-120"/>
               </a:rPr>
-              <a:t>国独法~260件</a:t>
+              <a:t>国独法~280件</a:t>
             </a:r>
             <a:endParaRPr lang="en-US" sz="1000" dirty="0"/>
           </a:p>
@@ -12913,7 +12913,7 @@
                 <a:ea typeface="Meiryo UI" pitchFamily="34" charset="-122"/>
                 <a:cs typeface="Meiryo UI" pitchFamily="34" charset="-120"/>
               </a:rPr>
-              <a:t>~729件</a:t>
+              <a:t>~784件</a:t>
             </a:r>
             <a:endParaRPr lang="en-US" sz="2200" dirty="0"/>
           </a:p>
@@ -12952,7 +12952,7 @@
                 <a:ea typeface="Meiryo UI" pitchFamily="34" charset="-122"/>
                 <a:cs typeface="Meiryo UI" pitchFamily="34" charset="-120"/>
               </a:rPr>
-              <a:t>自治体~370件</a:t>
+              <a:t>自治体~395件</a:t>
             </a:r>
             <a:endParaRPr lang="en-US" sz="1000" dirty="0"/>
           </a:p>
@@ -12991,7 +12991,7 @@
                 <a:ea typeface="Meiryo UI" pitchFamily="34" charset="-122"/>
                 <a:cs typeface="Meiryo UI" pitchFamily="34" charset="-120"/>
               </a:rPr>
-              <a:t>国独法~290件</a:t>
+              <a:t>国独法~315件</a:t>
             </a:r>
             <a:endParaRPr lang="en-US" sz="1000" dirty="0"/>
           </a:p>
@@ -13030,7 +13030,7 @@
                 <a:ea typeface="Meiryo UI" pitchFamily="34" charset="-122"/>
                 <a:cs typeface="Meiryo UI" pitchFamily="34" charset="-120"/>
               </a:rPr>
-              <a:t>※FY2025推計12ヶ月（~540件）を基準に算出</a:t>
+              <a:t>※FY2025推計12ヶ月（~581件）を基準に算出</a:t>
             </a:r>
             <a:endParaRPr lang="en-US" sz="800" dirty="0"/>
           </a:p>
@@ -13532,7 +13532,7 @@
                           <a:ea typeface="Meiryo UI" pitchFamily="34" charset="-122"/>
                           <a:cs typeface="Meiryo UI" pitchFamily="34" charset="-120"/>
                         </a:rPr>
-                        <a:t>~25件</a:t>
+                        <a:t>~21件</a:t>
                       </a:r>
                       <a:endParaRPr lang="en-US" sz="1000" dirty="0">
                         <a:latin typeface="Meiryo UI" charset="0"/>
@@ -13597,7 +13597,7 @@
                           <a:ea typeface="Meiryo UI" pitchFamily="34" charset="-122"/>
                           <a:cs typeface="Meiryo UI" pitchFamily="34" charset="-120"/>
                         </a:rPr>
-                        <a:t>~40件</a:t>
+                        <a:t>~35件</a:t>
                       </a:r>
                       <a:endParaRPr lang="en-US" sz="1000" dirty="0">
                         <a:latin typeface="Meiryo UI" charset="0"/>
@@ -13665,7 +13665,7 @@
                           <a:ea typeface="Meiryo UI" pitchFamily="34" charset="-122"/>
                           <a:cs typeface="Meiryo UI" pitchFamily="34" charset="-120"/>
                         </a:rPr>
-                        <a:t>+60%</a:t>
+                        <a:t>+67%</a:t>
                       </a:r>
                       <a:endParaRPr lang="en-US" sz="1000" dirty="0">
                         <a:latin typeface="Meiryo UI" charset="0"/>
@@ -14192,7 +14192,7 @@
                           <a:ea typeface="Meiryo UI" pitchFamily="34" charset="-122"/>
                           <a:cs typeface="Meiryo UI" pitchFamily="34" charset="-120"/>
                         </a:rPr>
-                        <a:t>~36件</a:t>
+                        <a:t>~48件</a:t>
                       </a:r>
                       <a:endParaRPr lang="en-US" sz="1000" dirty="0">
                         <a:latin typeface="Meiryo UI" charset="0"/>
@@ -14257,7 +14257,7 @@
                           <a:ea typeface="Meiryo UI" pitchFamily="34" charset="-122"/>
                           <a:cs typeface="Meiryo UI" pitchFamily="34" charset="-120"/>
                         </a:rPr>
-                        <a:t>~52件</a:t>
+                        <a:t>~60件</a:t>
                       </a:r>
                       <a:endParaRPr lang="en-US" sz="1000" dirty="0">
                         <a:latin typeface="Meiryo UI" charset="0"/>
@@ -14325,7 +14325,7 @@
                           <a:ea typeface="Meiryo UI" pitchFamily="34" charset="-122"/>
                           <a:cs typeface="Meiryo UI" pitchFamily="34" charset="-120"/>
                         </a:rPr>
-                        <a:t>+44%</a:t>
+                        <a:t>+25%</a:t>
                       </a:r>
                       <a:endParaRPr lang="en-US" sz="1000" dirty="0">
                         <a:latin typeface="Meiryo UI" charset="0"/>
@@ -14522,7 +14522,7 @@
                           <a:ea typeface="Meiryo UI" pitchFamily="34" charset="-122"/>
                           <a:cs typeface="Meiryo UI" pitchFamily="34" charset="-120"/>
                         </a:rPr>
-                        <a:t>~344件</a:t>
+                        <a:t>~370件</a:t>
                       </a:r>
                       <a:endParaRPr lang="en-US" sz="1000" dirty="0">
                         <a:latin typeface="Meiryo UI" charset="0"/>
@@ -14587,7 +14587,7 @@
                           <a:ea typeface="Meiryo UI" pitchFamily="34" charset="-122"/>
                           <a:cs typeface="Meiryo UI" pitchFamily="34" charset="-120"/>
                         </a:rPr>
-                        <a:t>~410件</a:t>
+                        <a:t>~430件</a:t>
                       </a:r>
                       <a:endParaRPr lang="en-US" sz="1000" dirty="0">
                         <a:latin typeface="Meiryo UI" charset="0"/>
@@ -14655,7 +14655,7 @@
                           <a:ea typeface="Meiryo UI" pitchFamily="34" charset="-122"/>
                           <a:cs typeface="Meiryo UI" pitchFamily="34" charset="-120"/>
                         </a:rPr>
-                        <a:t>+19%</a:t>
+                        <a:t>+16%</a:t>
                       </a:r>
                       <a:endParaRPr lang="en-US" sz="1000" dirty="0">
                         <a:latin typeface="Meiryo UI" charset="0"/>
@@ -14852,7 +14852,7 @@
                           <a:ea typeface="Meiryo UI" pitchFamily="34" charset="-122"/>
                           <a:cs typeface="Meiryo UI" pitchFamily="34" charset="-120"/>
                         </a:rPr>
-                        <a:t>~125件</a:t>
+                        <a:t>~133件</a:t>
                       </a:r>
                       <a:endParaRPr lang="en-US" sz="1000" dirty="0">
                         <a:latin typeface="Meiryo UI" charset="0"/>
@@ -14985,7 +14985,7 @@
                           <a:ea typeface="Meiryo UI" pitchFamily="34" charset="-122"/>
                           <a:cs typeface="Meiryo UI" pitchFamily="34" charset="-120"/>
                         </a:rPr>
-                        <a:t>+32%</a:t>
+                        <a:t>+24%</a:t>
                       </a:r>
                       <a:endParaRPr lang="en-US" sz="1000" dirty="0">
                         <a:latin typeface="Meiryo UI" charset="0"/>
@@ -15185,7 +15185,7 @@
                           <a:ea typeface="Meiryo UI" pitchFamily="34" charset="-122"/>
                           <a:cs typeface="Meiryo UI" pitchFamily="34" charset="-120"/>
                         </a:rPr>
-                        <a:t>~540件</a:t>
+                        <a:t>~581件</a:t>
                       </a:r>
                       <a:endParaRPr lang="en-US" sz="1000" dirty="0">
                         <a:latin typeface="Meiryo UI" charset="0"/>
@@ -15253,7 +15253,7 @@
                           <a:ea typeface="Meiryo UI" pitchFamily="34" charset="-122"/>
                           <a:cs typeface="Meiryo UI" pitchFamily="34" charset="-120"/>
                         </a:rPr>
-                        <a:t>~682件</a:t>
+                        <a:t>~705件</a:t>
                       </a:r>
                       <a:endParaRPr lang="en-US" sz="1000" dirty="0">
                         <a:latin typeface="Meiryo UI" charset="0"/>
@@ -15321,7 +15321,7 @@
                           <a:ea typeface="Meiryo UI" pitchFamily="34" charset="-122"/>
                           <a:cs typeface="Meiryo UI" pitchFamily="34" charset="-120"/>
                         </a:rPr>
-                        <a:t>+26%</a:t>
+                        <a:t>+21%</a:t>
                       </a:r>
                       <a:endParaRPr lang="en-US" sz="1000" dirty="0">
                         <a:latin typeface="Meiryo UI" charset="0"/>
@@ -15565,7 +15565,7 @@
                 <a:ea typeface="Meiryo UI" pitchFamily="34" charset="-122"/>
                 <a:cs typeface="Meiryo UI" pitchFamily="34" charset="-120"/>
               </a:rPr>
-              <a:t>全公共セクターの構築案件754件の内訳 — 年度推移と単価（中央値/平均）</a:t>
+              <a:t>全公共セクターの構築案件795件の内訳 — 年度推移と単価（中央値/平均）</a:t>
             </a:r>
             <a:endParaRPr lang="en-US" sz="1100" dirty="0"/>
           </a:p>
@@ -16167,7 +16167,7 @@
                           <a:ea typeface="Meiryo UI" pitchFamily="34" charset="-122"/>
                           <a:cs typeface="Meiryo UI" pitchFamily="34" charset="-120"/>
                         </a:rPr>
-                        <a:t>AI（その他）</a:t>
+                        <a:t>生成AI（その他）</a:t>
                       </a:r>
                       <a:endParaRPr lang="en-US" sz="1000" dirty="0">
                         <a:latin typeface="Meiryo UI" charset="0"/>
@@ -16232,7 +16232,7 @@
                           <a:ea typeface="Meiryo UI" pitchFamily="34" charset="-122"/>
                           <a:cs typeface="Meiryo UI" pitchFamily="34" charset="-120"/>
                         </a:rPr>
-                        <a:t>46</a:t>
+                        <a:t>31</a:t>
                       </a:r>
                       <a:endParaRPr lang="en-US" sz="1000" dirty="0">
                         <a:latin typeface="Meiryo UI" charset="0"/>
@@ -16297,7 +16297,7 @@
                           <a:ea typeface="Meiryo UI" pitchFamily="34" charset="-122"/>
                           <a:cs typeface="Meiryo UI" pitchFamily="34" charset="-120"/>
                         </a:rPr>
-                        <a:t>88</a:t>
+                        <a:t>121</a:t>
                       </a:r>
                       <a:endParaRPr lang="en-US" sz="1000" dirty="0">
                         <a:latin typeface="Meiryo UI" charset="0"/>
@@ -16362,7 +16362,7 @@
                           <a:ea typeface="Meiryo UI" pitchFamily="34" charset="-122"/>
                           <a:cs typeface="Meiryo UI" pitchFamily="34" charset="-120"/>
                         </a:rPr>
-                        <a:t>93</a:t>
+                        <a:t>138</a:t>
                       </a:r>
                       <a:endParaRPr lang="en-US" sz="1000" dirty="0">
                         <a:latin typeface="Meiryo UI" charset="0"/>
@@ -16430,7 +16430,7 @@
                           <a:ea typeface="Meiryo UI" pitchFamily="34" charset="-122"/>
                           <a:cs typeface="Meiryo UI" pitchFamily="34" charset="-120"/>
                         </a:rPr>
-                        <a:t>227</a:t>
+                        <a:t>290</a:t>
                       </a:r>
                       <a:endParaRPr lang="en-US" sz="1000" dirty="0">
                         <a:latin typeface="Meiryo UI" charset="0"/>
@@ -16487,7 +16487,137 @@
                         <a:buNone/>
                       </a:pPr>
                       <a:r>
-                        <a:rPr lang="en-US" sz="1000" dirty="0">
+                        <a:rPr lang="en-US" sz="1000" b="1" dirty="0">
+                          <a:solidFill>
+                            <a:srgbClr val="156082"/>
+                          </a:solidFill>
+                          <a:latin typeface="Meiryo UI" pitchFamily="34" charset="0"/>
+                          <a:ea typeface="Meiryo UI" pitchFamily="34" charset="-122"/>
+                          <a:cs typeface="Meiryo UI" pitchFamily="34" charset="-120"/>
+                        </a:rPr>
+                        <a:t>871万</a:t>
+                      </a:r>
+                      <a:endParaRPr lang="en-US" sz="1000" dirty="0">
+                        <a:latin typeface="Meiryo UI" charset="0"/>
+                        <a:ea typeface="Meiryo UI" charset="0"/>
+                        <a:cs typeface="Meiryo UI" charset="0"/>
+                      </a:endParaRPr>
+                    </a:p>
+                  </a:txBody>
+                  <a:tcPr marL="91440" marR="91440" marT="45720" marB="45720" anchor="ctr">
+                    <a:lnL w="6350" cap="flat" cmpd="sng" algn="ctr">
+                      <a:solidFill>
+                        <a:srgbClr val="E0E0E0"/>
+                      </a:solidFill>
+                      <a:prstDash val="solid"/>
+                      <a:round/>
+                      <a:headEnd type="none" w="med" len="med"/>
+                      <a:tailEnd type="none" w="med" len="med"/>
+                    </a:lnL>
+                    <a:lnR w="6350" cap="flat" cmpd="sng" algn="ctr">
+                      <a:solidFill>
+                        <a:srgbClr val="E0E0E0"/>
+                      </a:solidFill>
+                      <a:prstDash val="solid"/>
+                      <a:round/>
+                      <a:headEnd type="none" w="med" len="med"/>
+                      <a:tailEnd type="none" w="med" len="med"/>
+                    </a:lnR>
+                    <a:lnT w="6350" cap="flat" cmpd="sng" algn="ctr">
+                      <a:solidFill>
+                        <a:srgbClr val="E0E0E0"/>
+                      </a:solidFill>
+                      <a:prstDash val="solid"/>
+                      <a:round/>
+                      <a:headEnd type="none" w="med" len="med"/>
+                      <a:tailEnd type="none" w="med" len="med"/>
+                    </a:lnT>
+                    <a:lnB w="6350" cap="flat" cmpd="sng" algn="ctr">
+                      <a:solidFill>
+                        <a:srgbClr val="E0E0E0"/>
+                      </a:solidFill>
+                      <a:prstDash val="solid"/>
+                      <a:round/>
+                      <a:headEnd type="none" w="med" len="med"/>
+                      <a:tailEnd type="none" w="med" len="med"/>
+                    </a:lnB>
+                  </a:tcPr>
+                </a:tc>
+                <a:tc>
+                  <a:txBody>
+                    <a:bodyPr/>
+                    <a:lstStyle/>
+                    <a:p>
+                      <a:pPr algn="ctr" indent="0" marL="0">
+                        <a:buNone/>
+                      </a:pPr>
+                      <a:r>
+                        <a:rPr lang="en-US" sz="900" dirty="0">
+                          <a:solidFill>
+                            <a:srgbClr val="666666"/>
+                          </a:solidFill>
+                          <a:latin typeface="Meiryo UI" pitchFamily="34" charset="0"/>
+                          <a:ea typeface="Meiryo UI" pitchFamily="34" charset="-122"/>
+                          <a:cs typeface="Meiryo UI" pitchFamily="34" charset="-120"/>
+                        </a:rPr>
+                        <a:t>1.6億</a:t>
+                      </a:r>
+                      <a:endParaRPr lang="en-US" sz="900" dirty="0">
+                        <a:latin typeface="Meiryo UI" charset="0"/>
+                        <a:ea typeface="Meiryo UI" charset="0"/>
+                        <a:cs typeface="Meiryo UI" charset="0"/>
+                      </a:endParaRPr>
+                    </a:p>
+                  </a:txBody>
+                  <a:tcPr marL="91440" marR="91440" marT="45720" marB="45720" anchor="ctr">
+                    <a:lnL w="6350" cap="flat" cmpd="sng" algn="ctr">
+                      <a:solidFill>
+                        <a:srgbClr val="E0E0E0"/>
+                      </a:solidFill>
+                      <a:prstDash val="solid"/>
+                      <a:round/>
+                      <a:headEnd type="none" w="med" len="med"/>
+                      <a:tailEnd type="none" w="med" len="med"/>
+                    </a:lnL>
+                    <a:lnR w="6350" cap="flat" cmpd="sng" algn="ctr">
+                      <a:solidFill>
+                        <a:srgbClr val="E0E0E0"/>
+                      </a:solidFill>
+                      <a:prstDash val="solid"/>
+                      <a:round/>
+                      <a:headEnd type="none" w="med" len="med"/>
+                      <a:tailEnd type="none" w="med" len="med"/>
+                    </a:lnR>
+                    <a:lnT w="6350" cap="flat" cmpd="sng" algn="ctr">
+                      <a:solidFill>
+                        <a:srgbClr val="E0E0E0"/>
+                      </a:solidFill>
+                      <a:prstDash val="solid"/>
+                      <a:round/>
+                      <a:headEnd type="none" w="med" len="med"/>
+                      <a:tailEnd type="none" w="med" len="med"/>
+                    </a:lnT>
+                    <a:lnB w="6350" cap="flat" cmpd="sng" algn="ctr">
+                      <a:solidFill>
+                        <a:srgbClr val="E0E0E0"/>
+                      </a:solidFill>
+                      <a:prstDash val="solid"/>
+                      <a:round/>
+                      <a:headEnd type="none" w="med" len="med"/>
+                      <a:tailEnd type="none" w="med" len="med"/>
+                    </a:lnB>
+                  </a:tcPr>
+                </a:tc>
+                <a:tc>
+                  <a:txBody>
+                    <a:bodyPr/>
+                    <a:lstStyle/>
+                    <a:p>
+                      <a:pPr algn="l" indent="0" marL="0">
+                        <a:buNone/>
+                      </a:pPr>
+                      <a:r>
+                        <a:rPr lang="en-US" sz="900" dirty="0">
                           <a:solidFill>
                             <a:srgbClr val="333333"/>
                           </a:solidFill>
@@ -16495,137 +16625,7 @@
                           <a:ea typeface="Meiryo UI" pitchFamily="34" charset="-122"/>
                           <a:cs typeface="Meiryo UI" pitchFamily="34" charset="-120"/>
                         </a:rPr>
-                        <a:t>490万</a:t>
-                      </a:r>
-                      <a:endParaRPr lang="en-US" sz="1000" dirty="0">
-                        <a:latin typeface="Meiryo UI" charset="0"/>
-                        <a:ea typeface="Meiryo UI" charset="0"/>
-                        <a:cs typeface="Meiryo UI" charset="0"/>
-                      </a:endParaRPr>
-                    </a:p>
-                  </a:txBody>
-                  <a:tcPr marL="91440" marR="91440" marT="45720" marB="45720" anchor="ctr">
-                    <a:lnL w="6350" cap="flat" cmpd="sng" algn="ctr">
-                      <a:solidFill>
-                        <a:srgbClr val="E0E0E0"/>
-                      </a:solidFill>
-                      <a:prstDash val="solid"/>
-                      <a:round/>
-                      <a:headEnd type="none" w="med" len="med"/>
-                      <a:tailEnd type="none" w="med" len="med"/>
-                    </a:lnL>
-                    <a:lnR w="6350" cap="flat" cmpd="sng" algn="ctr">
-                      <a:solidFill>
-                        <a:srgbClr val="E0E0E0"/>
-                      </a:solidFill>
-                      <a:prstDash val="solid"/>
-                      <a:round/>
-                      <a:headEnd type="none" w="med" len="med"/>
-                      <a:tailEnd type="none" w="med" len="med"/>
-                    </a:lnR>
-                    <a:lnT w="6350" cap="flat" cmpd="sng" algn="ctr">
-                      <a:solidFill>
-                        <a:srgbClr val="E0E0E0"/>
-                      </a:solidFill>
-                      <a:prstDash val="solid"/>
-                      <a:round/>
-                      <a:headEnd type="none" w="med" len="med"/>
-                      <a:tailEnd type="none" w="med" len="med"/>
-                    </a:lnT>
-                    <a:lnB w="6350" cap="flat" cmpd="sng" algn="ctr">
-                      <a:solidFill>
-                        <a:srgbClr val="E0E0E0"/>
-                      </a:solidFill>
-                      <a:prstDash val="solid"/>
-                      <a:round/>
-                      <a:headEnd type="none" w="med" len="med"/>
-                      <a:tailEnd type="none" w="med" len="med"/>
-                    </a:lnB>
-                  </a:tcPr>
-                </a:tc>
-                <a:tc>
-                  <a:txBody>
-                    <a:bodyPr/>
-                    <a:lstStyle/>
-                    <a:p>
-                      <a:pPr algn="ctr" indent="0" marL="0">
-                        <a:buNone/>
-                      </a:pPr>
-                      <a:r>
-                        <a:rPr lang="en-US" sz="900" dirty="0">
-                          <a:solidFill>
-                            <a:srgbClr val="666666"/>
-                          </a:solidFill>
-                          <a:latin typeface="Meiryo UI" pitchFamily="34" charset="0"/>
-                          <a:ea typeface="Meiryo UI" pitchFamily="34" charset="-122"/>
-                          <a:cs typeface="Meiryo UI" pitchFamily="34" charset="-120"/>
-                        </a:rPr>
-                        <a:t>1,188万</a:t>
-                      </a:r>
-                      <a:endParaRPr lang="en-US" sz="900" dirty="0">
-                        <a:latin typeface="Meiryo UI" charset="0"/>
-                        <a:ea typeface="Meiryo UI" charset="0"/>
-                        <a:cs typeface="Meiryo UI" charset="0"/>
-                      </a:endParaRPr>
-                    </a:p>
-                  </a:txBody>
-                  <a:tcPr marL="91440" marR="91440" marT="45720" marB="45720" anchor="ctr">
-                    <a:lnL w="6350" cap="flat" cmpd="sng" algn="ctr">
-                      <a:solidFill>
-                        <a:srgbClr val="E0E0E0"/>
-                      </a:solidFill>
-                      <a:prstDash val="solid"/>
-                      <a:round/>
-                      <a:headEnd type="none" w="med" len="med"/>
-                      <a:tailEnd type="none" w="med" len="med"/>
-                    </a:lnL>
-                    <a:lnR w="6350" cap="flat" cmpd="sng" algn="ctr">
-                      <a:solidFill>
-                        <a:srgbClr val="E0E0E0"/>
-                      </a:solidFill>
-                      <a:prstDash val="solid"/>
-                      <a:round/>
-                      <a:headEnd type="none" w="med" len="med"/>
-                      <a:tailEnd type="none" w="med" len="med"/>
-                    </a:lnR>
-                    <a:lnT w="6350" cap="flat" cmpd="sng" algn="ctr">
-                      <a:solidFill>
-                        <a:srgbClr val="E0E0E0"/>
-                      </a:solidFill>
-                      <a:prstDash val="solid"/>
-                      <a:round/>
-                      <a:headEnd type="none" w="med" len="med"/>
-                      <a:tailEnd type="none" w="med" len="med"/>
-                    </a:lnT>
-                    <a:lnB w="6350" cap="flat" cmpd="sng" algn="ctr">
-                      <a:solidFill>
-                        <a:srgbClr val="E0E0E0"/>
-                      </a:solidFill>
-                      <a:prstDash val="solid"/>
-                      <a:round/>
-                      <a:headEnd type="none" w="med" len="med"/>
-                      <a:tailEnd type="none" w="med" len="med"/>
-                    </a:lnB>
-                  </a:tcPr>
-                </a:tc>
-                <a:tc>
-                  <a:txBody>
-                    <a:bodyPr/>
-                    <a:lstStyle/>
-                    <a:p>
-                      <a:pPr algn="l" indent="0" marL="0">
-                        <a:buNone/>
-                      </a:pPr>
-                      <a:r>
-                        <a:rPr lang="en-US" sz="900" dirty="0">
-                          <a:solidFill>
-                            <a:srgbClr val="333333"/>
-                          </a:solidFill>
-                          <a:latin typeface="Meiryo UI" pitchFamily="34" charset="0"/>
-                          <a:ea typeface="Meiryo UI" pitchFamily="34" charset="-122"/>
-                          <a:cs typeface="Meiryo UI" pitchFamily="34" charset="-120"/>
-                        </a:rPr>
-                        <a:t>平均は大型R&amp;Dで上振れ</a:t>
+                        <a:t>最多カテゴリ。NEDO等で平均大幅上振れ</a:t>
                       </a:r>
                       <a:endParaRPr lang="en-US" sz="900" dirty="0">
                         <a:latin typeface="Meiryo UI" charset="0"/>
@@ -16757,7 +16757,7 @@
                           <a:ea typeface="Meiryo UI" pitchFamily="34" charset="-122"/>
                           <a:cs typeface="Meiryo UI" pitchFamily="34" charset="-120"/>
                         </a:rPr>
-                        <a:t>58</a:t>
+                        <a:t>71</a:t>
                       </a:r>
                       <a:endParaRPr lang="en-US" sz="1000" dirty="0">
                         <a:latin typeface="Meiryo UI" charset="0"/>
@@ -16887,7 +16887,7 @@
                           <a:ea typeface="Meiryo UI" pitchFamily="34" charset="-122"/>
                           <a:cs typeface="Meiryo UI" pitchFamily="34" charset="-120"/>
                         </a:rPr>
-                        <a:t>51</a:t>
+                        <a:t>56</a:t>
                       </a:r>
                       <a:endParaRPr lang="en-US" sz="1000" dirty="0">
                         <a:latin typeface="Meiryo UI" charset="0"/>
@@ -16955,7 +16955,7 @@
                           <a:ea typeface="Meiryo UI" pitchFamily="34" charset="-122"/>
                           <a:cs typeface="Meiryo UI" pitchFamily="34" charset="-120"/>
                         </a:rPr>
-                        <a:t>170</a:t>
+                        <a:t>188</a:t>
                       </a:r>
                       <a:endParaRPr lang="en-US" sz="1000" dirty="0">
                         <a:latin typeface="Meiryo UI" charset="0"/>
@@ -17020,7 +17020,7 @@
                           <a:ea typeface="Meiryo UI" pitchFamily="34" charset="-122"/>
                           <a:cs typeface="Meiryo UI" pitchFamily="34" charset="-120"/>
                         </a:rPr>
-                        <a:t>336万</a:t>
+                        <a:t>363万</a:t>
                       </a:r>
                       <a:endParaRPr lang="en-US" sz="1000" dirty="0">
                         <a:latin typeface="Meiryo UI" charset="0"/>
@@ -17085,7 +17085,7 @@
                           <a:ea typeface="Meiryo UI" pitchFamily="34" charset="-122"/>
                           <a:cs typeface="Meiryo UI" pitchFamily="34" charset="-120"/>
                         </a:rPr>
-                        <a:t>3,259万</a:t>
+                        <a:t>2,644万</a:t>
                       </a:r>
                       <a:endParaRPr lang="en-US" sz="900" dirty="0">
                         <a:latin typeface="Meiryo UI" charset="0"/>
@@ -17150,7 +17150,7 @@
                           <a:ea typeface="Meiryo UI" pitchFamily="34" charset="-122"/>
                           <a:cs typeface="Meiryo UI" pitchFamily="34" charset="-120"/>
                         </a:rPr>
-                        <a:t>減少傾向。市場飽和</a:t>
+                        <a:t>緩やかに減少。市場成熟</a:t>
                       </a:r>
                       <a:endParaRPr lang="en-US" sz="900" dirty="0">
                         <a:latin typeface="Meiryo UI" charset="0"/>
@@ -17217,7 +17217,7 @@
                           <a:ea typeface="Meiryo UI" pitchFamily="34" charset="-122"/>
                           <a:cs typeface="Meiryo UI" pitchFamily="34" charset="-120"/>
                         </a:rPr>
-                        <a:t>生成AI（その他）</a:t>
+                        <a:t>RAG構築</a:t>
                       </a:r>
                       <a:endParaRPr lang="en-US" sz="1000" dirty="0">
                         <a:latin typeface="Meiryo UI" charset="0"/>
@@ -17282,7 +17282,7 @@
                           <a:ea typeface="Meiryo UI" pitchFamily="34" charset="-122"/>
                           <a:cs typeface="Meiryo UI" pitchFamily="34" charset="-120"/>
                         </a:rPr>
-                        <a:t>16</a:t>
+                        <a:t>40</a:t>
                       </a:r>
                       <a:endParaRPr lang="en-US" sz="1000" dirty="0">
                         <a:latin typeface="Meiryo UI" charset="0"/>
@@ -17347,7 +17347,7 @@
                           <a:ea typeface="Meiryo UI" pitchFamily="34" charset="-122"/>
                           <a:cs typeface="Meiryo UI" pitchFamily="34" charset="-120"/>
                         </a:rPr>
-                        <a:t>60</a:t>
+                        <a:t>48</a:t>
                       </a:r>
                       <a:endParaRPr lang="en-US" sz="1000" dirty="0">
                         <a:latin typeface="Meiryo UI" charset="0"/>
@@ -17412,7 +17412,7 @@
                           <a:ea typeface="Meiryo UI" pitchFamily="34" charset="-122"/>
                           <a:cs typeface="Meiryo UI" pitchFamily="34" charset="-120"/>
                         </a:rPr>
-                        <a:t>62</a:t>
+                        <a:t>42</a:t>
                       </a:r>
                       <a:endParaRPr lang="en-US" sz="1000" dirty="0">
                         <a:latin typeface="Meiryo UI" charset="0"/>
@@ -17480,7 +17480,7 @@
                           <a:ea typeface="Meiryo UI" pitchFamily="34" charset="-122"/>
                           <a:cs typeface="Meiryo UI" pitchFamily="34" charset="-120"/>
                         </a:rPr>
-                        <a:t>138</a:t>
+                        <a:t>130</a:t>
                       </a:r>
                       <a:endParaRPr lang="en-US" sz="1000" dirty="0">
                         <a:latin typeface="Meiryo UI" charset="0"/>
@@ -17537,15 +17537,15 @@
                         <a:buNone/>
                       </a:pPr>
                       <a:r>
-                        <a:rPr lang="en-US" sz="1000" b="1" dirty="0">
-                          <a:solidFill>
-                            <a:srgbClr val="156082"/>
-                          </a:solidFill>
-                          <a:latin typeface="Meiryo UI" pitchFamily="34" charset="0"/>
-                          <a:ea typeface="Meiryo UI" pitchFamily="34" charset="-122"/>
-                          <a:cs typeface="Meiryo UI" pitchFamily="34" charset="-120"/>
-                        </a:rPr>
-                        <a:t>785万</a:t>
+                        <a:rPr lang="en-US" sz="1000" dirty="0">
+                          <a:solidFill>
+                            <a:srgbClr val="333333"/>
+                          </a:solidFill>
+                          <a:latin typeface="Meiryo UI" pitchFamily="34" charset="0"/>
+                          <a:ea typeface="Meiryo UI" pitchFamily="34" charset="-122"/>
+                          <a:cs typeface="Meiryo UI" pitchFamily="34" charset="-120"/>
+                        </a:rPr>
+                        <a:t>282万</a:t>
                       </a:r>
                       <a:endParaRPr lang="en-US" sz="1000" dirty="0">
                         <a:latin typeface="Meiryo UI" charset="0"/>
@@ -17610,7 +17610,7 @@
                           <a:ea typeface="Meiryo UI" pitchFamily="34" charset="-122"/>
                           <a:cs typeface="Meiryo UI" pitchFamily="34" charset="-120"/>
                         </a:rPr>
-                        <a:t>1.4億</a:t>
+                        <a:t>1,410万</a:t>
                       </a:r>
                       <a:endParaRPr lang="en-US" sz="900" dirty="0">
                         <a:latin typeface="Meiryo UI" charset="0"/>
@@ -17667,15 +17667,15 @@
                         <a:buNone/>
                       </a:pPr>
                       <a:r>
-                        <a:rPr lang="en-US" sz="900" dirty="0">
-                          <a:solidFill>
-                            <a:srgbClr val="333333"/>
-                          </a:solidFill>
-                          <a:latin typeface="Meiryo UI" pitchFamily="34" charset="0"/>
-                          <a:ea typeface="Meiryo UI" pitchFamily="34" charset="-122"/>
-                          <a:cs typeface="Meiryo UI" pitchFamily="34" charset="-120"/>
-                        </a:rPr>
-                        <a:t>NEDO等で平均大幅上振れ</a:t>
+                        <a:rPr lang="en-US" sz="900" b="1" dirty="0">
+                          <a:solidFill>
+                            <a:srgbClr val="2E7D32"/>
+                          </a:solidFill>
+                          <a:latin typeface="Meiryo UI" pitchFamily="34" charset="0"/>
+                          <a:ea typeface="Meiryo UI" pitchFamily="34" charset="-122"/>
+                          <a:cs typeface="Meiryo UI" pitchFamily="34" charset="-120"/>
+                        </a:rPr>
+                        <a:t>安定推移。技術差別化</a:t>
                       </a:r>
                       <a:endParaRPr lang="en-US" sz="900" dirty="0">
                         <a:latin typeface="Meiryo UI" charset="0"/>
@@ -17807,7 +17807,7 @@
                           <a:ea typeface="Meiryo UI" pitchFamily="34" charset="-122"/>
                           <a:cs typeface="Meiryo UI" pitchFamily="34" charset="-120"/>
                         </a:rPr>
-                        <a:t>10</a:t>
+                        <a:t>7</a:t>
                       </a:r>
                       <a:endParaRPr lang="en-US" sz="1000" dirty="0">
                         <a:latin typeface="Meiryo UI" charset="0"/>
@@ -17872,7 +17872,7 @@
                           <a:ea typeface="Meiryo UI" pitchFamily="34" charset="-122"/>
                           <a:cs typeface="Meiryo UI" pitchFamily="34" charset="-120"/>
                         </a:rPr>
-                        <a:t>46</a:t>
+                        <a:t>43</a:t>
                       </a:r>
                       <a:endParaRPr lang="en-US" sz="1000" dirty="0">
                         <a:latin typeface="Meiryo UI" charset="0"/>
@@ -17937,7 +17937,7 @@
                           <a:ea typeface="Meiryo UI" pitchFamily="34" charset="-122"/>
                           <a:cs typeface="Meiryo UI" pitchFamily="34" charset="-120"/>
                         </a:rPr>
-                        <a:t>58</a:t>
+                        <a:t>57</a:t>
                       </a:r>
                       <a:endParaRPr lang="en-US" sz="1000" dirty="0">
                         <a:latin typeface="Meiryo UI" charset="0"/>
@@ -18005,7 +18005,7 @@
                           <a:ea typeface="Meiryo UI" pitchFamily="34" charset="-122"/>
                           <a:cs typeface="Meiryo UI" pitchFamily="34" charset="-120"/>
                         </a:rPr>
-                        <a:t>114</a:t>
+                        <a:t>107</a:t>
                       </a:r>
                       <a:endParaRPr lang="en-US" sz="1000" dirty="0">
                         <a:latin typeface="Meiryo UI" charset="0"/>
@@ -18070,7 +18070,7 @@
                           <a:ea typeface="Meiryo UI" pitchFamily="34" charset="-122"/>
                           <a:cs typeface="Meiryo UI" pitchFamily="34" charset="-120"/>
                         </a:rPr>
-                        <a:t>428万</a:t>
+                        <a:t>335万</a:t>
                       </a:r>
                       <a:endParaRPr lang="en-US" sz="1000" dirty="0">
                         <a:latin typeface="Meiryo UI" charset="0"/>
@@ -18135,7 +18135,7 @@
                           <a:ea typeface="Meiryo UI" pitchFamily="34" charset="-122"/>
                           <a:cs typeface="Meiryo UI" pitchFamily="34" charset="-120"/>
                         </a:rPr>
-                        <a:t>4,905万</a:t>
+                        <a:t>3,785万</a:t>
                       </a:r>
                       <a:endParaRPr lang="en-US" sz="900" dirty="0">
                         <a:latin typeface="Meiryo UI" charset="0"/>
@@ -18267,7 +18267,7 @@
                           <a:ea typeface="Meiryo UI" pitchFamily="34" charset="-122"/>
                           <a:cs typeface="Meiryo UI" pitchFamily="34" charset="-120"/>
                         </a:rPr>
-                        <a:t>RAG構築</a:t>
+                        <a:t>AI（その他）</a:t>
                       </a:r>
                       <a:endParaRPr lang="en-US" sz="1000" dirty="0">
                         <a:latin typeface="Meiryo UI" charset="0"/>
@@ -18397,7 +18397,7 @@
                           <a:ea typeface="Meiryo UI" pitchFamily="34" charset="-122"/>
                           <a:cs typeface="Meiryo UI" pitchFamily="34" charset="-120"/>
                         </a:rPr>
-                        <a:t>16</a:t>
+                        <a:t>13</a:t>
                       </a:r>
                       <a:endParaRPr lang="en-US" sz="1000" dirty="0">
                         <a:latin typeface="Meiryo UI" charset="0"/>
@@ -18462,7 +18462,7 @@
                           <a:ea typeface="Meiryo UI" pitchFamily="34" charset="-122"/>
                           <a:cs typeface="Meiryo UI" pitchFamily="34" charset="-120"/>
                         </a:rPr>
-                        <a:t>24</a:t>
+                        <a:t>23</a:t>
                       </a:r>
                       <a:endParaRPr lang="en-US" sz="1000" dirty="0">
                         <a:latin typeface="Meiryo UI" charset="0"/>
@@ -18530,7 +18530,7 @@
                           <a:ea typeface="Meiryo UI" pitchFamily="34" charset="-122"/>
                           <a:cs typeface="Meiryo UI" pitchFamily="34" charset="-120"/>
                         </a:rPr>
-                        <a:t>51</a:t>
+                        <a:t>47</a:t>
                       </a:r>
                       <a:endParaRPr lang="en-US" sz="1000" dirty="0">
                         <a:latin typeface="Meiryo UI" charset="0"/>
@@ -18595,7 +18595,7 @@
                           <a:ea typeface="Meiryo UI" pitchFamily="34" charset="-122"/>
                           <a:cs typeface="Meiryo UI" pitchFamily="34" charset="-120"/>
                         </a:rPr>
-                        <a:t>245万</a:t>
+                        <a:t>649万</a:t>
                       </a:r>
                       <a:endParaRPr lang="en-US" sz="1000" dirty="0">
                         <a:latin typeface="Meiryo UI" charset="0"/>
@@ -18660,7 +18660,7 @@
                           <a:ea typeface="Meiryo UI" pitchFamily="34" charset="-122"/>
                           <a:cs typeface="Meiryo UI" pitchFamily="34" charset="-120"/>
                         </a:rPr>
-                        <a:t>427万</a:t>
+                        <a:t>1,462万</a:t>
                       </a:r>
                       <a:endParaRPr lang="en-US" sz="900" dirty="0">
                         <a:latin typeface="Meiryo UI" charset="0"/>
@@ -18717,15 +18717,15 @@
                         <a:buNone/>
                       </a:pPr>
                       <a:r>
-                        <a:rPr lang="en-US" sz="900" b="1" dirty="0">
-                          <a:solidFill>
-                            <a:srgbClr val="2E7D32"/>
-                          </a:solidFill>
-                          <a:latin typeface="Meiryo UI" pitchFamily="34" charset="0"/>
-                          <a:ea typeface="Meiryo UI" pitchFamily="34" charset="-122"/>
-                          <a:cs typeface="Meiryo UI" pitchFamily="34" charset="-120"/>
-                        </a:rPr>
-                        <a:t>着実増加。技術差別化</a:t>
+                        <a:rPr lang="en-US" sz="900" dirty="0">
+                          <a:solidFill>
+                            <a:srgbClr val="333333"/>
+                          </a:solidFill>
+                          <a:latin typeface="Meiryo UI" pitchFamily="34" charset="0"/>
+                          <a:ea typeface="Meiryo UI" pitchFamily="34" charset="-122"/>
+                          <a:cs typeface="Meiryo UI" pitchFamily="34" charset="-120"/>
+                        </a:rPr>
+                        <a:t>増加傾向</a:t>
                       </a:r>
                       <a:endParaRPr lang="en-US" sz="900" dirty="0">
                         <a:latin typeface="Meiryo UI" charset="0"/>
@@ -18792,7 +18792,7 @@
                           <a:ea typeface="Meiryo UI" pitchFamily="34" charset="-122"/>
                           <a:cs typeface="Meiryo UI" pitchFamily="34" charset="-120"/>
                         </a:rPr>
-                        <a:t>庁内生成AI環境</a:t>
+                        <a:t>活用支援・コンサル</a:t>
                       </a:r>
                       <a:endParaRPr lang="en-US" sz="1000" dirty="0">
                         <a:latin typeface="Meiryo UI" charset="0"/>
@@ -18857,7 +18857,7 @@
                           <a:ea typeface="Meiryo UI" pitchFamily="34" charset="-122"/>
                           <a:cs typeface="Meiryo UI" pitchFamily="34" charset="-120"/>
                         </a:rPr>
-                        <a:t>4</a:t>
+                        <a:t>0</a:t>
                       </a:r>
                       <a:endParaRPr lang="en-US" sz="1000" dirty="0">
                         <a:latin typeface="Meiryo UI" charset="0"/>
@@ -18922,7 +18922,7 @@
                           <a:ea typeface="Meiryo UI" pitchFamily="34" charset="-122"/>
                           <a:cs typeface="Meiryo UI" pitchFamily="34" charset="-120"/>
                         </a:rPr>
-                        <a:t>9</a:t>
+                        <a:t>5</a:t>
                       </a:r>
                       <a:endParaRPr lang="en-US" sz="1000" dirty="0">
                         <a:latin typeface="Meiryo UI" charset="0"/>
@@ -18987,7 +18987,7 @@
                           <a:ea typeface="Meiryo UI" pitchFamily="34" charset="-122"/>
                           <a:cs typeface="Meiryo UI" pitchFamily="34" charset="-120"/>
                         </a:rPr>
-                        <a:t>10</a:t>
+                        <a:t>15</a:t>
                       </a:r>
                       <a:endParaRPr lang="en-US" sz="1000" dirty="0">
                         <a:latin typeface="Meiryo UI" charset="0"/>
@@ -19055,7 +19055,7 @@
                           <a:ea typeface="Meiryo UI" pitchFamily="34" charset="-122"/>
                           <a:cs typeface="Meiryo UI" pitchFamily="34" charset="-120"/>
                         </a:rPr>
-                        <a:t>23</a:t>
+                        <a:t>20</a:t>
                       </a:r>
                       <a:endParaRPr lang="en-US" sz="1000" dirty="0">
                         <a:latin typeface="Meiryo UI" charset="0"/>
@@ -19120,7 +19120,7 @@
                           <a:ea typeface="Meiryo UI" pitchFamily="34" charset="-122"/>
                           <a:cs typeface="Meiryo UI" pitchFamily="34" charset="-120"/>
                         </a:rPr>
-                        <a:t>-</a:t>
+                        <a:t>254万</a:t>
                       </a:r>
                       <a:endParaRPr lang="en-US" sz="1000" dirty="0">
                         <a:latin typeface="Meiryo UI" charset="0"/>
@@ -19179,13 +19179,13 @@
                       <a:r>
                         <a:rPr lang="en-US" sz="900" dirty="0">
                           <a:solidFill>
-                            <a:srgbClr val="333333"/>
-                          </a:solidFill>
-                          <a:latin typeface="Meiryo UI" pitchFamily="34" charset="0"/>
-                          <a:ea typeface="Meiryo UI" pitchFamily="34" charset="-122"/>
-                          <a:cs typeface="Meiryo UI" pitchFamily="34" charset="-120"/>
-                        </a:rPr>
-                        <a:t>-</a:t>
+                            <a:srgbClr val="666666"/>
+                          </a:solidFill>
+                          <a:latin typeface="Meiryo UI" pitchFamily="34" charset="0"/>
+                          <a:ea typeface="Meiryo UI" pitchFamily="34" charset="-122"/>
+                          <a:cs typeface="Meiryo UI" pitchFamily="34" charset="-120"/>
+                        </a:rPr>
+                        <a:t>527万</a:t>
                       </a:r>
                       <a:endParaRPr lang="en-US" sz="900" dirty="0">
                         <a:latin typeface="Meiryo UI" charset="0"/>
@@ -19242,15 +19242,15 @@
                         <a:buNone/>
                       </a:pPr>
                       <a:r>
-                        <a:rPr lang="en-US" sz="900" dirty="0">
-                          <a:solidFill>
-                            <a:srgbClr val="333333"/>
-                          </a:solidFill>
-                          <a:latin typeface="Meiryo UI" pitchFamily="34" charset="0"/>
-                          <a:ea typeface="Meiryo UI" pitchFamily="34" charset="-122"/>
-                          <a:cs typeface="Meiryo UI" pitchFamily="34" charset="-120"/>
-                        </a:rPr>
-                        <a:t>安定推移</a:t>
+                        <a:rPr lang="en-US" sz="900" b="1" dirty="0">
+                          <a:solidFill>
+                            <a:srgbClr val="2E7D32"/>
+                          </a:solidFill>
+                          <a:latin typeface="Meiryo UI" pitchFamily="34" charset="0"/>
+                          <a:ea typeface="Meiryo UI" pitchFamily="34" charset="-122"/>
+                          <a:cs typeface="Meiryo UI" pitchFamily="34" charset="-120"/>
+                        </a:rPr>
+                        <a:t>急拡大中</a:t>
                       </a:r>
                       <a:endParaRPr lang="en-US" sz="900" dirty="0">
                         <a:latin typeface="Meiryo UI" charset="0"/>
@@ -19382,72 +19382,72 @@
                           <a:ea typeface="Meiryo UI" pitchFamily="34" charset="-122"/>
                           <a:cs typeface="Meiryo UI" pitchFamily="34" charset="-120"/>
                         </a:rPr>
+                        <a:t>0</a:t>
+                      </a:r>
+                      <a:endParaRPr lang="en-US" sz="1000" dirty="0">
+                        <a:latin typeface="Meiryo UI" charset="0"/>
+                        <a:ea typeface="Meiryo UI" charset="0"/>
+                        <a:cs typeface="Meiryo UI" charset="0"/>
+                      </a:endParaRPr>
+                    </a:p>
+                  </a:txBody>
+                  <a:tcPr marL="91440" marR="91440" marT="45720" marB="45720" anchor="ctr">
+                    <a:lnL w="6350" cap="flat" cmpd="sng" algn="ctr">
+                      <a:solidFill>
+                        <a:srgbClr val="E0E0E0"/>
+                      </a:solidFill>
+                      <a:prstDash val="solid"/>
+                      <a:round/>
+                      <a:headEnd type="none" w="med" len="med"/>
+                      <a:tailEnd type="none" w="med" len="med"/>
+                    </a:lnL>
+                    <a:lnR w="6350" cap="flat" cmpd="sng" algn="ctr">
+                      <a:solidFill>
+                        <a:srgbClr val="E0E0E0"/>
+                      </a:solidFill>
+                      <a:prstDash val="solid"/>
+                      <a:round/>
+                      <a:headEnd type="none" w="med" len="med"/>
+                      <a:tailEnd type="none" w="med" len="med"/>
+                    </a:lnR>
+                    <a:lnT w="6350" cap="flat" cmpd="sng" algn="ctr">
+                      <a:solidFill>
+                        <a:srgbClr val="E0E0E0"/>
+                      </a:solidFill>
+                      <a:prstDash val="solid"/>
+                      <a:round/>
+                      <a:headEnd type="none" w="med" len="med"/>
+                      <a:tailEnd type="none" w="med" len="med"/>
+                    </a:lnT>
+                    <a:lnB w="6350" cap="flat" cmpd="sng" algn="ctr">
+                      <a:solidFill>
+                        <a:srgbClr val="E0E0E0"/>
+                      </a:solidFill>
+                      <a:prstDash val="solid"/>
+                      <a:round/>
+                      <a:headEnd type="none" w="med" len="med"/>
+                      <a:tailEnd type="none" w="med" len="med"/>
+                    </a:lnB>
+                  </a:tcPr>
+                </a:tc>
+                <a:tc>
+                  <a:txBody>
+                    <a:bodyPr/>
+                    <a:lstStyle/>
+                    <a:p>
+                      <a:pPr algn="ctr" indent="0" marL="0">
+                        <a:buNone/>
+                      </a:pPr>
+                      <a:r>
+                        <a:rPr lang="en-US" sz="1000" dirty="0">
+                          <a:solidFill>
+                            <a:srgbClr val="333333"/>
+                          </a:solidFill>
+                          <a:latin typeface="Meiryo UI" pitchFamily="34" charset="0"/>
+                          <a:ea typeface="Meiryo UI" pitchFamily="34" charset="-122"/>
+                          <a:cs typeface="Meiryo UI" pitchFamily="34" charset="-120"/>
+                        </a:rPr>
                         <a:t>3</a:t>
-                      </a:r>
-                      <a:endParaRPr lang="en-US" sz="1000" dirty="0">
-                        <a:latin typeface="Meiryo UI" charset="0"/>
-                        <a:ea typeface="Meiryo UI" charset="0"/>
-                        <a:cs typeface="Meiryo UI" charset="0"/>
-                      </a:endParaRPr>
-                    </a:p>
-                  </a:txBody>
-                  <a:tcPr marL="91440" marR="91440" marT="45720" marB="45720" anchor="ctr">
-                    <a:lnL w="6350" cap="flat" cmpd="sng" algn="ctr">
-                      <a:solidFill>
-                        <a:srgbClr val="E0E0E0"/>
-                      </a:solidFill>
-                      <a:prstDash val="solid"/>
-                      <a:round/>
-                      <a:headEnd type="none" w="med" len="med"/>
-                      <a:tailEnd type="none" w="med" len="med"/>
-                    </a:lnL>
-                    <a:lnR w="6350" cap="flat" cmpd="sng" algn="ctr">
-                      <a:solidFill>
-                        <a:srgbClr val="E0E0E0"/>
-                      </a:solidFill>
-                      <a:prstDash val="solid"/>
-                      <a:round/>
-                      <a:headEnd type="none" w="med" len="med"/>
-                      <a:tailEnd type="none" w="med" len="med"/>
-                    </a:lnR>
-                    <a:lnT w="6350" cap="flat" cmpd="sng" algn="ctr">
-                      <a:solidFill>
-                        <a:srgbClr val="E0E0E0"/>
-                      </a:solidFill>
-                      <a:prstDash val="solid"/>
-                      <a:round/>
-                      <a:headEnd type="none" w="med" len="med"/>
-                      <a:tailEnd type="none" w="med" len="med"/>
-                    </a:lnT>
-                    <a:lnB w="6350" cap="flat" cmpd="sng" algn="ctr">
-                      <a:solidFill>
-                        <a:srgbClr val="E0E0E0"/>
-                      </a:solidFill>
-                      <a:prstDash val="solid"/>
-                      <a:round/>
-                      <a:headEnd type="none" w="med" len="med"/>
-                      <a:tailEnd type="none" w="med" len="med"/>
-                    </a:lnB>
-                  </a:tcPr>
-                </a:tc>
-                <a:tc>
-                  <a:txBody>
-                    <a:bodyPr/>
-                    <a:lstStyle/>
-                    <a:p>
-                      <a:pPr algn="ctr" indent="0" marL="0">
-                        <a:buNone/>
-                      </a:pPr>
-                      <a:r>
-                        <a:rPr lang="en-US" sz="1000" dirty="0">
-                          <a:solidFill>
-                            <a:srgbClr val="333333"/>
-                          </a:solidFill>
-                          <a:latin typeface="Meiryo UI" pitchFamily="34" charset="0"/>
-                          <a:ea typeface="Meiryo UI" pitchFamily="34" charset="-122"/>
-                          <a:cs typeface="Meiryo UI" pitchFamily="34" charset="-120"/>
-                        </a:rPr>
-                        <a:t>7</a:t>
                       </a:r>
                       <a:endParaRPr lang="en-US" sz="1000" dirty="0">
                         <a:latin typeface="Meiryo UI" charset="0"/>
@@ -19580,7 +19580,7 @@
                           <a:ea typeface="Meiryo UI" pitchFamily="34" charset="-122"/>
                           <a:cs typeface="Meiryo UI" pitchFamily="34" charset="-120"/>
                         </a:rPr>
-                        <a:t>17</a:t>
+                        <a:t>10</a:t>
                       </a:r>
                       <a:endParaRPr lang="en-US" sz="1000" dirty="0">
                         <a:latin typeface="Meiryo UI" charset="0"/>
@@ -19842,7 +19842,7 @@
                           <a:ea typeface="Meiryo UI" pitchFamily="34" charset="-122"/>
                           <a:cs typeface="Meiryo UI" pitchFamily="34" charset="-120"/>
                         </a:rPr>
-                        <a:t>活用支援・コンサル</a:t>
+                        <a:t>庁内生成AI環境</a:t>
                       </a:r>
                       <a:endParaRPr lang="en-US" sz="1000" dirty="0">
                         <a:latin typeface="Meiryo UI" charset="0"/>
@@ -19907,7 +19907,7 @@
                           <a:ea typeface="Meiryo UI" pitchFamily="34" charset="-122"/>
                           <a:cs typeface="Meiryo UI" pitchFamily="34" charset="-120"/>
                         </a:rPr>
-                        <a:t>0</a:t>
+                        <a:t>1</a:t>
                       </a:r>
                       <a:endParaRPr lang="en-US" sz="1000" dirty="0">
                         <a:latin typeface="Meiryo UI" charset="0"/>
@@ -19972,7 +19972,7 @@
                           <a:ea typeface="Meiryo UI" pitchFamily="34" charset="-122"/>
                           <a:cs typeface="Meiryo UI" pitchFamily="34" charset="-120"/>
                         </a:rPr>
-                        <a:t>2</a:t>
+                        <a:t>1</a:t>
                       </a:r>
                       <a:endParaRPr lang="en-US" sz="1000" dirty="0">
                         <a:latin typeface="Meiryo UI" charset="0"/>
@@ -20037,7 +20037,7 @@
                           <a:ea typeface="Meiryo UI" pitchFamily="34" charset="-122"/>
                           <a:cs typeface="Meiryo UI" pitchFamily="34" charset="-120"/>
                         </a:rPr>
-                        <a:t>8</a:t>
+                        <a:t>1</a:t>
                       </a:r>
                       <a:endParaRPr lang="en-US" sz="1000" dirty="0">
                         <a:latin typeface="Meiryo UI" charset="0"/>
@@ -20105,7 +20105,7 @@
                           <a:ea typeface="Meiryo UI" pitchFamily="34" charset="-122"/>
                           <a:cs typeface="Meiryo UI" pitchFamily="34" charset="-120"/>
                         </a:rPr>
-                        <a:t>10</a:t>
+                        <a:t>3</a:t>
                       </a:r>
                       <a:endParaRPr lang="en-US" sz="1000" dirty="0">
                         <a:latin typeface="Meiryo UI" charset="0"/>
@@ -20170,7 +20170,7 @@
                           <a:ea typeface="Meiryo UI" pitchFamily="34" charset="-122"/>
                           <a:cs typeface="Meiryo UI" pitchFamily="34" charset="-120"/>
                         </a:rPr>
-                        <a:t>254万</a:t>
+                        <a:t>-</a:t>
                       </a:r>
                       <a:endParaRPr lang="en-US" sz="1000" dirty="0">
                         <a:latin typeface="Meiryo UI" charset="0"/>
@@ -20229,13 +20229,13 @@
                       <a:r>
                         <a:rPr lang="en-US" sz="900" dirty="0">
                           <a:solidFill>
-                            <a:srgbClr val="666666"/>
-                          </a:solidFill>
-                          <a:latin typeface="Meiryo UI" pitchFamily="34" charset="0"/>
-                          <a:ea typeface="Meiryo UI" pitchFamily="34" charset="-122"/>
-                          <a:cs typeface="Meiryo UI" pitchFamily="34" charset="-120"/>
-                        </a:rPr>
-                        <a:t>527万</a:t>
+                            <a:srgbClr val="333333"/>
+                          </a:solidFill>
+                          <a:latin typeface="Meiryo UI" pitchFamily="34" charset="0"/>
+                          <a:ea typeface="Meiryo UI" pitchFamily="34" charset="-122"/>
+                          <a:cs typeface="Meiryo UI" pitchFamily="34" charset="-120"/>
+                        </a:rPr>
+                        <a:t>-</a:t>
                       </a:r>
                       <a:endParaRPr lang="en-US" sz="900" dirty="0">
                         <a:latin typeface="Meiryo UI" charset="0"/>
@@ -20292,15 +20292,15 @@
                         <a:buNone/>
                       </a:pPr>
                       <a:r>
-                        <a:rPr lang="en-US" sz="900" b="1" dirty="0">
-                          <a:solidFill>
-                            <a:srgbClr val="2E7D32"/>
-                          </a:solidFill>
-                          <a:latin typeface="Meiryo UI" pitchFamily="34" charset="0"/>
-                          <a:ea typeface="Meiryo UI" pitchFamily="34" charset="-122"/>
-                          <a:cs typeface="Meiryo UI" pitchFamily="34" charset="-120"/>
-                        </a:rPr>
-                        <a:t>急拡大中</a:t>
+                        <a:rPr lang="en-US" sz="900" dirty="0">
+                          <a:solidFill>
+                            <a:srgbClr val="333333"/>
+                          </a:solidFill>
+                          <a:latin typeface="Meiryo UI" pitchFamily="34" charset="0"/>
+                          <a:ea typeface="Meiryo UI" pitchFamily="34" charset="-122"/>
+                          <a:cs typeface="Meiryo UI" pitchFamily="34" charset="-120"/>
+                        </a:rPr>
+                        <a:t>金額データなし</a:t>
                       </a:r>
                       <a:endParaRPr lang="en-US" sz="900" dirty="0">
                         <a:latin typeface="Meiryo UI" charset="0"/>
@@ -20435,7 +20435,7 @@
                           <a:ea typeface="Meiryo UI" pitchFamily="34" charset="-122"/>
                           <a:cs typeface="Meiryo UI" pitchFamily="34" charset="-120"/>
                         </a:rPr>
-                        <a:t>148</a:t>
+                        <a:t>161</a:t>
                       </a:r>
                       <a:endParaRPr lang="en-US" sz="1000" dirty="0">
                         <a:latin typeface="Meiryo UI" charset="0"/>
@@ -20503,7 +20503,7 @@
                           <a:ea typeface="Meiryo UI" pitchFamily="34" charset="-122"/>
                           <a:cs typeface="Meiryo UI" pitchFamily="34" charset="-120"/>
                         </a:rPr>
-                        <a:t>291</a:t>
+                        <a:t>295</a:t>
                       </a:r>
                       <a:endParaRPr lang="en-US" sz="1000" dirty="0">
                         <a:latin typeface="Meiryo UI" charset="0"/>
@@ -20571,7 +20571,7 @@
                           <a:ea typeface="Meiryo UI" pitchFamily="34" charset="-122"/>
                           <a:cs typeface="Meiryo UI" pitchFamily="34" charset="-120"/>
                         </a:rPr>
-                        <a:t>315</a:t>
+                        <a:t>339</a:t>
                       </a:r>
                       <a:endParaRPr lang="en-US" sz="1000" dirty="0">
                         <a:latin typeface="Meiryo UI" charset="0"/>
@@ -20639,7 +20639,7 @@
                           <a:ea typeface="Meiryo UI" pitchFamily="34" charset="-122"/>
                           <a:cs typeface="Meiryo UI" pitchFamily="34" charset="-120"/>
                         </a:rPr>
-                        <a:t>754</a:t>
+                        <a:t>795</a:t>
                       </a:r>
                       <a:endParaRPr lang="en-US" sz="1000" dirty="0">
                         <a:latin typeface="Meiryo UI" charset="0"/>
@@ -20707,7 +20707,7 @@
                           <a:ea typeface="Meiryo UI" pitchFamily="34" charset="-122"/>
                           <a:cs typeface="Meiryo UI" pitchFamily="34" charset="-120"/>
                         </a:rPr>
-                        <a:t>475万</a:t>
+                        <a:t>494万</a:t>
                       </a:r>
                       <a:endParaRPr lang="en-US" sz="1000" dirty="0">
                         <a:latin typeface="Meiryo UI" charset="0"/>
@@ -20775,7 +20775,7 @@
                           <a:ea typeface="Meiryo UI" pitchFamily="34" charset="-122"/>
                           <a:cs typeface="Meiryo UI" pitchFamily="34" charset="-120"/>
                         </a:rPr>
-                        <a:t>7,058万</a:t>
+                        <a:t>7,621万</a:t>
                       </a:r>
                       <a:endParaRPr lang="en-US" sz="1000" dirty="0">
                         <a:latin typeface="Meiryo UI" charset="0"/>
@@ -20988,7 +20988,7 @@
                 <a:ea typeface="Meiryo UI" pitchFamily="34" charset="-122"/>
                 <a:cs typeface="Meiryo UI" pitchFamily="34" charset="-120"/>
               </a:rPr>
-              <a:t>✓  ④構築全体の中央値は475万円（平均7,058万はNEDO等の大型R&amp;Dで上振れ）。NTTDXPNの主戦場はMedium帯</a:t>
+              <a:t>✓  ④構築全体の中央値は494万円（平均7,621万はNEDO等の大型R&amp;Dで上振れ）。NTTDXPNの主戦場はMedium帯</a:t>
             </a:r>
             <a:endParaRPr lang="en-US" sz="1000" dirty="0"/>
           </a:p>
@@ -21008,7 +21008,7 @@
                 <a:ea typeface="Meiryo UI" pitchFamily="34" charset="-122"/>
                 <a:cs typeface="Meiryo UI" pitchFamily="34" charset="-120"/>
               </a:rPr>
-              <a:t>✓  生成AIサービス導入が最大成長カテゴリ（10→46→58件）。中央値428万でSaaS型が主流</a:t>
+              <a:t>✓  生成AIサービス導入が最大成長カテゴリ（7→43→57件）。SaaS型導入が主流化</a:t>
             </a:r>
             <a:endParaRPr lang="en-US" sz="1000" dirty="0"/>
           </a:p>
@@ -21028,7 +21028,7 @@
                 <a:ea typeface="Meiryo UI" pitchFamily="34" charset="-122"/>
                 <a:cs typeface="Meiryo UI" pitchFamily="34" charset="-120"/>
               </a:rPr>
-              <a:t>✓  教育・学校AI は中央値3,960万の高単価領域。RAG構築（中央値245万）は技術差別化で勝負</a:t>
+              <a:t>✓  教育・学校AI は中央値3,960万の高単価領域。活用支援・コンサル（0→5→15件）が急拡大中</a:t>
             </a:r>
             <a:endParaRPr lang="en-US" sz="1000" dirty="0"/>
           </a:p>
@@ -21736,7 +21736,7 @@
                           <a:ea typeface="Meiryo UI" pitchFamily="34" charset="-122"/>
                           <a:cs typeface="Meiryo UI" pitchFamily="34" charset="-120"/>
                         </a:rPr>
-                        <a:t>16件</a:t>
+                        <a:t>~13件</a:t>
                       </a:r>
                       <a:endParaRPr lang="en-US" sz="1000" dirty="0">
                         <a:latin typeface="Meiryo UI" charset="0"/>
@@ -21801,7 +21801,7 @@
                           <a:ea typeface="Meiryo UI" pitchFamily="34" charset="-122"/>
                           <a:cs typeface="Meiryo UI" pitchFamily="34" charset="-120"/>
                         </a:rPr>
-                        <a:t>7件</a:t>
+                        <a:t>~6件</a:t>
                       </a:r>
                       <a:endParaRPr lang="en-US" sz="1000" dirty="0">
                         <a:latin typeface="Meiryo UI" charset="0"/>
@@ -21866,7 +21866,7 @@
                           <a:ea typeface="Meiryo UI" pitchFamily="34" charset="-122"/>
                           <a:cs typeface="Meiryo UI" pitchFamily="34" charset="-120"/>
                         </a:rPr>
-                        <a:t>23件</a:t>
+                        <a:t>19件</a:t>
                       </a:r>
                       <a:endParaRPr lang="en-US" sz="1000" dirty="0">
                         <a:latin typeface="Meiryo UI" charset="0"/>
@@ -21934,7 +21934,7 @@
                           <a:ea typeface="Meiryo UI" pitchFamily="34" charset="-122"/>
                           <a:cs typeface="Meiryo UI" pitchFamily="34" charset="-120"/>
                         </a:rPr>
-                        <a:t>70%</a:t>
+                        <a:t>~70%</a:t>
                       </a:r>
                       <a:endParaRPr lang="en-US" sz="1000" dirty="0">
                         <a:latin typeface="Meiryo UI" charset="0"/>
@@ -22131,7 +22131,7 @@
                           <a:ea typeface="Meiryo UI" pitchFamily="34" charset="-122"/>
                           <a:cs typeface="Meiryo UI" pitchFamily="34" charset="-120"/>
                         </a:rPr>
-                        <a:t>7件</a:t>
+                        <a:t>~7件</a:t>
                       </a:r>
                       <a:endParaRPr lang="en-US" sz="1000" dirty="0">
                         <a:latin typeface="Meiryo UI" charset="0"/>
@@ -22196,7 +22196,7 @@
                           <a:ea typeface="Meiryo UI" pitchFamily="34" charset="-122"/>
                           <a:cs typeface="Meiryo UI" pitchFamily="34" charset="-120"/>
                         </a:rPr>
-                        <a:t>2件</a:t>
+                        <a:t>~2件</a:t>
                       </a:r>
                       <a:endParaRPr lang="en-US" sz="1000" dirty="0">
                         <a:latin typeface="Meiryo UI" charset="0"/>
@@ -22329,7 +22329,7 @@
                           <a:ea typeface="Meiryo UI" pitchFamily="34" charset="-122"/>
                           <a:cs typeface="Meiryo UI" pitchFamily="34" charset="-120"/>
                         </a:rPr>
-                        <a:t>78%</a:t>
+                        <a:t>~78%</a:t>
                       </a:r>
                       <a:endParaRPr lang="en-US" sz="1000" dirty="0">
                         <a:latin typeface="Meiryo UI" charset="0"/>
@@ -22526,7 +22526,7 @@
                           <a:ea typeface="Meiryo UI" pitchFamily="34" charset="-122"/>
                           <a:cs typeface="Meiryo UI" pitchFamily="34" charset="-120"/>
                         </a:rPr>
-                        <a:t>7件</a:t>
+                        <a:t>~10件</a:t>
                       </a:r>
                       <a:endParaRPr lang="en-US" sz="1000" dirty="0">
                         <a:latin typeface="Meiryo UI" charset="0"/>
@@ -22591,7 +22591,7 @@
                           <a:ea typeface="Meiryo UI" pitchFamily="34" charset="-122"/>
                           <a:cs typeface="Meiryo UI" pitchFamily="34" charset="-120"/>
                         </a:rPr>
-                        <a:t>26件</a:t>
+                        <a:t>~34件</a:t>
                       </a:r>
                       <a:endParaRPr lang="en-US" sz="1000" dirty="0">
                         <a:latin typeface="Meiryo UI" charset="0"/>
@@ -22656,7 +22656,7 @@
                           <a:ea typeface="Meiryo UI" pitchFamily="34" charset="-122"/>
                           <a:cs typeface="Meiryo UI" pitchFamily="34" charset="-120"/>
                         </a:rPr>
-                        <a:t>33件</a:t>
+                        <a:t>44件</a:t>
                       </a:r>
                       <a:endParaRPr lang="en-US" sz="1000" dirty="0">
                         <a:latin typeface="Meiryo UI" charset="0"/>
@@ -22724,7 +22724,7 @@
                           <a:ea typeface="Meiryo UI" pitchFamily="34" charset="-122"/>
                           <a:cs typeface="Meiryo UI" pitchFamily="34" charset="-120"/>
                         </a:rPr>
-                        <a:t>21%</a:t>
+                        <a:t>~23%</a:t>
                       </a:r>
                       <a:endParaRPr lang="en-US" sz="1000" dirty="0">
                         <a:latin typeface="Meiryo UI" charset="0"/>
@@ -22921,7 +22921,7 @@
                           <a:ea typeface="Meiryo UI" pitchFamily="34" charset="-122"/>
                           <a:cs typeface="Meiryo UI" pitchFamily="34" charset="-120"/>
                         </a:rPr>
-                        <a:t>151件</a:t>
+                        <a:t>~170件</a:t>
                       </a:r>
                       <a:endParaRPr lang="en-US" sz="1000" dirty="0">
                         <a:latin typeface="Meiryo UI" charset="0"/>
@@ -22986,7 +22986,7 @@
                           <a:ea typeface="Meiryo UI" pitchFamily="34" charset="-122"/>
                           <a:cs typeface="Meiryo UI" pitchFamily="34" charset="-120"/>
                         </a:rPr>
-                        <a:t>164件</a:t>
+                        <a:t>~169件</a:t>
                       </a:r>
                       <a:endParaRPr lang="en-US" sz="1000" dirty="0">
                         <a:latin typeface="Meiryo UI" charset="0"/>
@@ -23051,7 +23051,7 @@
                           <a:ea typeface="Meiryo UI" pitchFamily="34" charset="-122"/>
                           <a:cs typeface="Meiryo UI" pitchFamily="34" charset="-120"/>
                         </a:rPr>
-                        <a:t>315件</a:t>
+                        <a:t>339件</a:t>
                       </a:r>
                       <a:endParaRPr lang="en-US" sz="1000" dirty="0">
                         <a:latin typeface="Meiryo UI" charset="0"/>
@@ -23119,7 +23119,7 @@
                           <a:ea typeface="Meiryo UI" pitchFamily="34" charset="-122"/>
                           <a:cs typeface="Meiryo UI" pitchFamily="34" charset="-120"/>
                         </a:rPr>
-                        <a:t>48%</a:t>
+                        <a:t>~50%</a:t>
                       </a:r>
                       <a:endParaRPr lang="en-US" sz="1000" dirty="0">
                         <a:latin typeface="Meiryo UI" charset="0"/>
@@ -23316,7 +23316,7 @@
                           <a:ea typeface="Meiryo UI" pitchFamily="34" charset="-122"/>
                           <a:cs typeface="Meiryo UI" pitchFamily="34" charset="-120"/>
                         </a:rPr>
-                        <a:t>73件</a:t>
+                        <a:t>~76件</a:t>
                       </a:r>
                       <a:endParaRPr lang="en-US" sz="1000" dirty="0">
                         <a:latin typeface="Meiryo UI" charset="0"/>
@@ -23381,7 +23381,7 @@
                           <a:ea typeface="Meiryo UI" pitchFamily="34" charset="-122"/>
                           <a:cs typeface="Meiryo UI" pitchFamily="34" charset="-120"/>
                         </a:rPr>
-                        <a:t>42件</a:t>
+                        <a:t>~46件</a:t>
                       </a:r>
                       <a:endParaRPr lang="en-US" sz="1000" dirty="0">
                         <a:latin typeface="Meiryo UI" charset="0"/>
@@ -23446,7 +23446,7 @@
                           <a:ea typeface="Meiryo UI" pitchFamily="34" charset="-122"/>
                           <a:cs typeface="Meiryo UI" pitchFamily="34" charset="-120"/>
                         </a:rPr>
-                        <a:t>115件</a:t>
+                        <a:t>122件</a:t>
                       </a:r>
                       <a:endParaRPr lang="en-US" sz="1000" dirty="0">
                         <a:latin typeface="Meiryo UI" charset="0"/>
@@ -23514,7 +23514,7 @@
                           <a:ea typeface="Meiryo UI" pitchFamily="34" charset="-122"/>
                           <a:cs typeface="Meiryo UI" pitchFamily="34" charset="-120"/>
                         </a:rPr>
-                        <a:t>63%</a:t>
+                        <a:t>~62%</a:t>
                       </a:r>
                       <a:endParaRPr lang="en-US" sz="1000" dirty="0">
                         <a:latin typeface="Meiryo UI" charset="0"/>
@@ -23714,7 +23714,7 @@
                           <a:ea typeface="Meiryo UI" pitchFamily="34" charset="-122"/>
                           <a:cs typeface="Meiryo UI" pitchFamily="34" charset="-120"/>
                         </a:rPr>
-                        <a:t>254件</a:t>
+                        <a:t>~275件</a:t>
                       </a:r>
                       <a:endParaRPr lang="en-US" sz="1000" dirty="0">
                         <a:latin typeface="Meiryo UI" charset="0"/>
@@ -23782,7 +23782,7 @@
                           <a:ea typeface="Meiryo UI" pitchFamily="34" charset="-122"/>
                           <a:cs typeface="Meiryo UI" pitchFamily="34" charset="-120"/>
                         </a:rPr>
-                        <a:t>241件</a:t>
+                        <a:t>~210件</a:t>
                       </a:r>
                       <a:endParaRPr lang="en-US" sz="1000" dirty="0">
                         <a:latin typeface="Meiryo UI" charset="0"/>
@@ -23850,7 +23850,7 @@
                           <a:ea typeface="Meiryo UI" pitchFamily="34" charset="-122"/>
                           <a:cs typeface="Meiryo UI" pitchFamily="34" charset="-120"/>
                         </a:rPr>
-                        <a:t>495件</a:t>
+                        <a:t>533件</a:t>
                       </a:r>
                       <a:endParaRPr lang="en-US" sz="1000" dirty="0">
                         <a:latin typeface="Meiryo UI" charset="0"/>
@@ -23918,7 +23918,7 @@
                           <a:ea typeface="Meiryo UI" pitchFamily="34" charset="-122"/>
                           <a:cs typeface="Meiryo UI" pitchFamily="34" charset="-120"/>
                         </a:rPr>
-                        <a:t>51%</a:t>
+                        <a:t>52%</a:t>
                       </a:r>
                       <a:endParaRPr lang="en-US" sz="1000" dirty="0">
                         <a:latin typeface="Meiryo UI" charset="0"/>
@@ -24193,7 +24193,7 @@
                 <a:ea typeface="Meiryo UI" pitchFamily="34" charset="-122"/>
                 <a:cs typeface="Meiryo UI" pitchFamily="34" charset="-120"/>
               </a:rPr>
-              <a:t>→ ⑤運用でストック収益化（63%が自治体）</a:t>
+              <a:t>→ ⑤運用でストック収益化（62%が自治体）</a:t>
             </a:r>
             <a:endParaRPr lang="en-US" sz="1000" dirty="0"/>
           </a:p>
@@ -24370,7 +24370,7 @@
                 <a:ea typeface="Meiryo UI" pitchFamily="34" charset="-122"/>
                 <a:cs typeface="Meiryo UI" pitchFamily="34" charset="-120"/>
               </a:rPr>
-              <a:t>③PoCが入口（国比率79%）</a:t>
+              <a:t>③PoCが入口（国比率77%）</a:t>
             </a:r>
             <a:endParaRPr lang="en-US" sz="1000" dirty="0"/>
           </a:p>
@@ -24410,7 +24410,7 @@
                 <a:ea typeface="Meiryo UI" pitchFamily="34" charset="-122"/>
                 <a:cs typeface="Meiryo UI" pitchFamily="34" charset="-120"/>
               </a:rPr>
-              <a:t>→ ④構築で半数の164件が国・独法</a:t>
+              <a:t>→ ④構築で半数の169件が国・独法</a:t>
             </a:r>
             <a:endParaRPr lang="en-US" sz="1000" dirty="0"/>
           </a:p>
@@ -24439,7 +24439,7 @@
                 <a:ea typeface="Meiryo UI" pitchFamily="34" charset="-122"/>
                 <a:cs typeface="Meiryo UI" pitchFamily="34" charset="-120"/>
               </a:rPr>
-              <a:t>NTTデータ（17件/8.9億）連携がカギ</a:t>
+              <a:t>NTTデータ（10件/2.0億）連携がカギ</a:t>
             </a:r>
             <a:endParaRPr lang="en-US" sz="1000" dirty="0"/>
           </a:p>
@@ -24825,7 +24825,7 @@
                 <a:ea typeface="Meiryo UI" pitchFamily="34" charset="-122"/>
                 <a:cs typeface="Meiryo UI" pitchFamily="34" charset="-120"/>
               </a:rPr>
-              <a:t>全1,207件中、金額判明は約50%（~640件）。</a:t>
+              <a:t>全1,269件中、金額判明は約54%（683件）。</a:t>
             </a:r>
             <a:endParaRPr lang="en-US" sz="900" dirty="0"/>
           </a:p>
@@ -24970,7 +24970,7 @@
                 <a:ea typeface="Meiryo UI" pitchFamily="34" charset="-122"/>
                 <a:cs typeface="Meiryo UI" pitchFamily="34" charset="-120"/>
               </a:rPr>
-              <a:t>66件 / 14.3億円</a:t>
+              <a:t>48件 / 6.0億円</a:t>
             </a:r>
             <a:endParaRPr lang="en-US" sz="2200" dirty="0"/>
           </a:p>
@@ -25009,7 +25009,7 @@
                 <a:ea typeface="Meiryo UI" pitchFamily="34" charset="-122"/>
                 <a:cs typeface="Meiryo UI" pitchFamily="34" charset="-120"/>
               </a:rPr>
-              <a:t>（シェア5.5%）</a:t>
+              <a:t>（シェア3.8%）</a:t>
             </a:r>
             <a:endParaRPr lang="en-US" sz="1100" dirty="0"/>
           </a:p>
@@ -25335,7 +25335,7 @@
                           <a:ea typeface="Meiryo UI" pitchFamily="34" charset="-122"/>
                           <a:cs typeface="Meiryo UI" pitchFamily="34" charset="-120"/>
                         </a:rPr>
-                        <a:t>NTTデータ</a:t>
+                        <a:t>NTT東日本</a:t>
                       </a:r>
                       <a:endParaRPr lang="en-US" sz="900" dirty="0">
                         <a:latin typeface="Meiryo UI" charset="0"/>
@@ -25400,7 +25400,7 @@
                           <a:ea typeface="Meiryo UI" pitchFamily="34" charset="-122"/>
                           <a:cs typeface="Meiryo UI" pitchFamily="34" charset="-120"/>
                         </a:rPr>
-                        <a:t>17件</a:t>
+                        <a:t>12件</a:t>
                       </a:r>
                       <a:endParaRPr lang="en-US" sz="900" dirty="0">
                         <a:latin typeface="Meiryo UI" charset="0"/>
@@ -25465,7 +25465,7 @@
                           <a:ea typeface="Meiryo UI" pitchFamily="34" charset="-122"/>
                           <a:cs typeface="Meiryo UI" pitchFamily="34" charset="-120"/>
                         </a:rPr>
-                        <a:t>8.9億</a:t>
+                        <a:t>2.1億</a:t>
                       </a:r>
                       <a:endParaRPr lang="en-US" sz="900" dirty="0">
                         <a:latin typeface="Meiryo UI" charset="0"/>
@@ -25530,7 +25530,7 @@
                           <a:ea typeface="Meiryo UI" pitchFamily="34" charset="-122"/>
                           <a:cs typeface="Meiryo UI" pitchFamily="34" charset="-120"/>
                         </a:rPr>
-                        <a:t>国機関の大型案件</a:t>
+                        <a:t>自治体④構築</a:t>
                       </a:r>
                       <a:endParaRPr lang="en-US" sz="900" dirty="0">
                         <a:latin typeface="Meiryo UI" charset="0"/>
@@ -25597,7 +25597,7 @@
                           <a:ea typeface="Meiryo UI" pitchFamily="34" charset="-122"/>
                           <a:cs typeface="Meiryo UI" pitchFamily="34" charset="-120"/>
                         </a:rPr>
-                        <a:t>NTT東日本</a:t>
+                        <a:t>NTTデータ</a:t>
                       </a:r>
                       <a:endParaRPr lang="en-US" sz="900" dirty="0">
                         <a:latin typeface="Meiryo UI" charset="0"/>
@@ -25662,7 +25662,7 @@
                           <a:ea typeface="Meiryo UI" pitchFamily="34" charset="-122"/>
                           <a:cs typeface="Meiryo UI" pitchFamily="34" charset="-120"/>
                         </a:rPr>
-                        <a:t>11件</a:t>
+                        <a:t>10件</a:t>
                       </a:r>
                       <a:endParaRPr lang="en-US" sz="900" dirty="0">
                         <a:latin typeface="Meiryo UI" charset="0"/>
@@ -25727,7 +25727,7 @@
                           <a:ea typeface="Meiryo UI" pitchFamily="34" charset="-122"/>
                           <a:cs typeface="Meiryo UI" pitchFamily="34" charset="-120"/>
                         </a:rPr>
-                        <a:t>1.7億</a:t>
+                        <a:t>2.0億</a:t>
                       </a:r>
                       <a:endParaRPr lang="en-US" sz="900" dirty="0">
                         <a:latin typeface="Meiryo UI" charset="0"/>
@@ -25792,7 +25792,7 @@
                           <a:ea typeface="Meiryo UI" pitchFamily="34" charset="-122"/>
                           <a:cs typeface="Meiryo UI" pitchFamily="34" charset="-120"/>
                         </a:rPr>
-                        <a:t>自治体④構築</a:t>
+                        <a:t>国機関の大型案件</a:t>
                       </a:r>
                       <a:endParaRPr lang="en-US" sz="900" dirty="0">
                         <a:latin typeface="Meiryo UI" charset="0"/>
@@ -25989,7 +25989,7 @@
                           <a:ea typeface="Meiryo UI" pitchFamily="34" charset="-122"/>
                           <a:cs typeface="Meiryo UI" pitchFamily="34" charset="-120"/>
                         </a:rPr>
-                        <a:t>3,011万</a:t>
+                        <a:t>3,012万</a:t>
                       </a:r>
                       <a:endParaRPr lang="en-US" sz="900" dirty="0">
                         <a:latin typeface="Meiryo UI" charset="0"/>
@@ -26186,7 +26186,7 @@
                           <a:ea typeface="Meiryo UI" pitchFamily="34" charset="-122"/>
                           <a:cs typeface="Meiryo UI" pitchFamily="34" charset="-120"/>
                         </a:rPr>
-                        <a:t>31件</a:t>
+                        <a:t>19件</a:t>
                       </a:r>
                       <a:endParaRPr lang="en-US" sz="900" dirty="0">
                         <a:latin typeface="Meiryo UI" charset="0"/>
@@ -26251,7 +26251,7 @@
                           <a:ea typeface="Meiryo UI" pitchFamily="34" charset="-122"/>
                           <a:cs typeface="Meiryo UI" pitchFamily="34" charset="-120"/>
                         </a:rPr>
-                        <a:t>3.7億</a:t>
+                        <a:t>1.9億</a:t>
                       </a:r>
                       <a:endParaRPr lang="en-US" sz="900" dirty="0">
                         <a:latin typeface="Meiryo UI" charset="0"/>
@@ -27210,7 +27210,7 @@
                 <a:ea typeface="Meiryo UI" pitchFamily="34" charset="-122"/>
                 <a:cs typeface="Meiryo UI" pitchFamily="34" charset="-120"/>
               </a:rPr>
-              <a:t>  （自治体+国+独法 33件が応札可能）</a:t>
+              <a:t>  （自治体+国+独法 30件が応札可能）</a:t>
             </a:r>
             <a:endParaRPr lang="en-US" sz="900" dirty="0"/>
           </a:p>

</xml_diff>